<commit_message>
Final draft of poster board
</commit_message>
<xml_diff>
--- a/Posterboard.pptx
+++ b/Posterboard.pptx
@@ -4,6 +4,9 @@
   <p:sldMasterIdLst>
     <p:sldMasterId id="2147483672" r:id="rId1"/>
   </p:sldMasterIdLst>
+  <p:notesMasterIdLst>
+    <p:notesMasterId r:id="rId3"/>
+  </p:notesMasterIdLst>
   <p:sldIdLst>
     <p:sldId id="256" r:id="rId2"/>
   </p:sldIdLst>
@@ -104,7 +107,531 @@
       </a:defRPr>
     </a:lvl9pPr>
   </p:defaultTextStyle>
+  <p:extLst>
+    <p:ext uri="{EFAFB233-063F-42B5-8137-9DF3F51BA10A}">
+      <p15:sldGuideLst xmlns:p15="http://schemas.microsoft.com/office/powerpoint/2012/main"/>
+    </p:ext>
+  </p:extLst>
 </p:presentation>
+</file>
+
+<file path=ppt/commentAuthors.xml><?xml version="1.0" encoding="utf-8"?>
+<p:cmAuthorLst xmlns:a="http://schemas.openxmlformats.org/drawingml/2006/main" xmlns:r="http://schemas.openxmlformats.org/officeDocument/2006/relationships" xmlns:p="http://schemas.openxmlformats.org/presentationml/2006/main">
+  <p:cmAuthor id="1" name="MICHAEL GILDEIN" initials="MG" lastIdx="8" clrIdx="0">
+    <p:extLst/>
+  </p:cmAuthor>
+</p:cmAuthorLst>
+</file>
+
+<file path=ppt/comments/comment1.xml><?xml version="1.0" encoding="utf-8"?>
+<p:cmLst xmlns:a="http://schemas.openxmlformats.org/drawingml/2006/main" xmlns:r="http://schemas.openxmlformats.org/officeDocument/2006/relationships" xmlns:p="http://schemas.openxmlformats.org/presentationml/2006/main">
+  <p:cm authorId="1" dt="2020-05-06T17:22:25.267" idx="1">
+    <p:pos x="28411" y="3589"/>
+    <p:text>Pu advisor Michael gildein</p:text>
+    <p:extLst mod="1">
+      <p:ext uri="{C676402C-5697-4E1C-873F-D02D1690AC5C}">
+        <p15:threadingInfo xmlns:p15="http://schemas.microsoft.com/office/powerpoint/2012/main" timeZoneBias="240"/>
+      </p:ext>
+    </p:extLst>
+  </p:cm>
+  <p:cm authorId="1" dt="2020-05-06T17:22:44.531" idx="2">
+    <p:pos x="-895" y="37"/>
+    <p:text>Add link to GitHub repo</p:text>
+    <p:extLst mod="1">
+      <p:ext uri="{C676402C-5697-4E1C-873F-D02D1690AC5C}">
+        <p15:threadingInfo xmlns:p15="http://schemas.microsoft.com/office/powerpoint/2012/main" timeZoneBias="240"/>
+      </p:ext>
+    </p:extLst>
+  </p:cm>
+  <p:cm authorId="1" dt="2020-05-06T17:23:11.429" idx="3">
+    <p:pos x="-662" y="1395"/>
+    <p:text>Any document similarity analysis not just patent enforemcent</p:text>
+    <p:extLst mod="1">
+      <p:ext uri="{C676402C-5697-4E1C-873F-D02D1690AC5C}">
+        <p15:threadingInfo xmlns:p15="http://schemas.microsoft.com/office/powerpoint/2012/main" timeZoneBias="240"/>
+      </p:ext>
+    </p:extLst>
+  </p:cm>
+  <p:cm authorId="1" dt="2020-05-06T17:23:53.218" idx="4">
+    <p:pos x="-648" y="997"/>
+    <p:text>Add what each tech is since we have plentyy of area to take up</p:text>
+    <p:extLst mod="1">
+      <p:ext uri="{C676402C-5697-4E1C-873F-D02D1690AC5C}">
+        <p15:threadingInfo xmlns:p15="http://schemas.microsoft.com/office/powerpoint/2012/main" timeZoneBias="240"/>
+      </p:ext>
+    </p:extLst>
+  </p:cm>
+  <p:cm authorId="1" dt="2020-05-06T17:24:23.200" idx="5">
+    <p:pos x="-635" y="1011"/>
+    <p:text>Add some text around this and clearer legends like corpus size</p:text>
+    <p:extLst mod="1">
+      <p:ext uri="{C676402C-5697-4E1C-873F-D02D1690AC5C}">
+        <p15:threadingInfo xmlns:p15="http://schemas.microsoft.com/office/powerpoint/2012/main" timeZoneBias="240"/>
+      </p:ext>
+    </p:extLst>
+  </p:cm>
+  <p:cm authorId="1" dt="2020-05-06T17:25:03.884" idx="6">
+    <p:pos x="-1471" y="421"/>
+    <p:text>Add average efficacy improvement numbers</p:text>
+    <p:extLst mod="1">
+      <p:ext uri="{C676402C-5697-4E1C-873F-D02D1690AC5C}">
+        <p15:threadingInfo xmlns:p15="http://schemas.microsoft.com/office/powerpoint/2012/main" timeZoneBias="240"/>
+      </p:ext>
+    </p:extLst>
+  </p:cm>
+  <p:cm authorId="1" dt="2020-05-06T17:26:59.366" idx="7">
+    <p:pos x="-717" y="984"/>
+    <p:text>Add a spot describing the corpus</p:text>
+    <p:extLst mod="1">
+      <p:ext uri="{C676402C-5697-4E1C-873F-D02D1690AC5C}">
+        <p15:threadingInfo xmlns:p15="http://schemas.microsoft.com/office/powerpoint/2012/main" timeZoneBias="240"/>
+      </p:ext>
+    </p:extLst>
+  </p:cm>
+  <p:cm authorId="1" dt="2020-05-06T17:27:44.582" idx="8">
+    <p:pos x="-1800" y="613"/>
+    <p:text/>
+    <p:extLst mod="1">
+      <p:ext uri="{C676402C-5697-4E1C-873F-D02D1690AC5C}">
+        <p15:threadingInfo xmlns:p15="http://schemas.microsoft.com/office/powerpoint/2012/main" timeZoneBias="240"/>
+      </p:ext>
+    </p:extLst>
+  </p:cm>
+</p:cmLst>
+</file>
+
+<file path=ppt/notesMasters/notesMaster1.xml><?xml version="1.0" encoding="utf-8"?>
+<p:notesMaster xmlns:a="http://schemas.openxmlformats.org/drawingml/2006/main" xmlns:r="http://schemas.openxmlformats.org/officeDocument/2006/relationships" xmlns:p="http://schemas.openxmlformats.org/presentationml/2006/main">
+  <p:cSld>
+    <p:bg>
+      <p:bgRef idx="1001">
+        <a:schemeClr val="bg1"/>
+      </p:bgRef>
+    </p:bg>
+    <p:spTree>
+      <p:nvGrpSpPr>
+        <p:cNvPr id="1" name=""/>
+        <p:cNvGrpSpPr/>
+        <p:nvPr/>
+      </p:nvGrpSpPr>
+      <p:grpSpPr>
+        <a:xfrm>
+          <a:off x="0" y="0"/>
+          <a:ext cx="0" cy="0"/>
+          <a:chOff x="0" y="0"/>
+          <a:chExt cx="0" cy="0"/>
+        </a:xfrm>
+      </p:grpSpPr>
+      <p:sp>
+        <p:nvSpPr>
+          <p:cNvPr id="2" name="Header Placeholder 1"/>
+          <p:cNvSpPr>
+            <a:spLocks noGrp="1"/>
+          </p:cNvSpPr>
+          <p:nvPr>
+            <p:ph type="hdr" sz="quarter"/>
+          </p:nvPr>
+        </p:nvSpPr>
+        <p:spPr>
+          <a:xfrm>
+            <a:off x="0" y="0"/>
+            <a:ext cx="2971800" cy="458788"/>
+          </a:xfrm>
+          <a:prstGeom prst="rect">
+            <a:avLst/>
+          </a:prstGeom>
+        </p:spPr>
+        <p:txBody>
+          <a:bodyPr vert="horz" lIns="91440" tIns="45720" rIns="91440" bIns="45720" rtlCol="0"/>
+          <a:lstStyle>
+            <a:lvl1pPr algn="l">
+              <a:defRPr sz="1200"/>
+            </a:lvl1pPr>
+          </a:lstStyle>
+          <a:p>
+            <a:endParaRPr lang="en-US"/>
+          </a:p>
+        </p:txBody>
+      </p:sp>
+      <p:sp>
+        <p:nvSpPr>
+          <p:cNvPr id="3" name="Date Placeholder 2"/>
+          <p:cNvSpPr>
+            <a:spLocks noGrp="1"/>
+          </p:cNvSpPr>
+          <p:nvPr>
+            <p:ph type="dt" idx="1"/>
+          </p:nvPr>
+        </p:nvSpPr>
+        <p:spPr>
+          <a:xfrm>
+            <a:off x="3884613" y="0"/>
+            <a:ext cx="2971800" cy="458788"/>
+          </a:xfrm>
+          <a:prstGeom prst="rect">
+            <a:avLst/>
+          </a:prstGeom>
+        </p:spPr>
+        <p:txBody>
+          <a:bodyPr vert="horz" lIns="91440" tIns="45720" rIns="91440" bIns="45720" rtlCol="0"/>
+          <a:lstStyle>
+            <a:lvl1pPr algn="r">
+              <a:defRPr sz="1200"/>
+            </a:lvl1pPr>
+          </a:lstStyle>
+          <a:p>
+            <a:fld id="{7C16191F-4BA6-934F-8509-9615579A1148}" type="datetimeFigureOut">
+              <a:rPr lang="en-US" smtClean="0"/>
+              <a:t>5/8/20</a:t>
+            </a:fld>
+            <a:endParaRPr lang="en-US"/>
+          </a:p>
+        </p:txBody>
+      </p:sp>
+      <p:sp>
+        <p:nvSpPr>
+          <p:cNvPr id="4" name="Slide Image Placeholder 3"/>
+          <p:cNvSpPr>
+            <a:spLocks noGrp="1" noRot="1" noChangeAspect="1"/>
+          </p:cNvSpPr>
+          <p:nvPr>
+            <p:ph type="sldImg" idx="2"/>
+          </p:nvPr>
+        </p:nvSpPr>
+        <p:spPr>
+          <a:xfrm>
+            <a:off x="1371600" y="1143000"/>
+            <a:ext cx="4114800" cy="3086100"/>
+          </a:xfrm>
+          <a:prstGeom prst="rect">
+            <a:avLst/>
+          </a:prstGeom>
+          <a:noFill/>
+          <a:ln w="12700">
+            <a:solidFill>
+              <a:prstClr val="black"/>
+            </a:solidFill>
+          </a:ln>
+        </p:spPr>
+        <p:txBody>
+          <a:bodyPr vert="horz" lIns="91440" tIns="45720" rIns="91440" bIns="45720" rtlCol="0" anchor="ctr"/>
+          <a:lstStyle/>
+          <a:p>
+            <a:endParaRPr lang="en-US"/>
+          </a:p>
+        </p:txBody>
+      </p:sp>
+      <p:sp>
+        <p:nvSpPr>
+          <p:cNvPr id="5" name="Notes Placeholder 4"/>
+          <p:cNvSpPr>
+            <a:spLocks noGrp="1"/>
+          </p:cNvSpPr>
+          <p:nvPr>
+            <p:ph type="body" sz="quarter" idx="3"/>
+          </p:nvPr>
+        </p:nvSpPr>
+        <p:spPr>
+          <a:xfrm>
+            <a:off x="685800" y="4400550"/>
+            <a:ext cx="5486400" cy="3600450"/>
+          </a:xfrm>
+          <a:prstGeom prst="rect">
+            <a:avLst/>
+          </a:prstGeom>
+        </p:spPr>
+        <p:txBody>
+          <a:bodyPr vert="horz" lIns="91440" tIns="45720" rIns="91440" bIns="45720" rtlCol="0"/>
+          <a:lstStyle/>
+          <a:p>
+            <a:pPr lvl="0"/>
+            <a:r>
+              <a:rPr lang="en-US" smtClean="0"/>
+              <a:t>Click to edit Master text styles</a:t>
+            </a:r>
+          </a:p>
+          <a:p>
+            <a:pPr lvl="1"/>
+            <a:r>
+              <a:rPr lang="en-US" smtClean="0"/>
+              <a:t>Second level</a:t>
+            </a:r>
+          </a:p>
+          <a:p>
+            <a:pPr lvl="2"/>
+            <a:r>
+              <a:rPr lang="en-US" smtClean="0"/>
+              <a:t>Third level</a:t>
+            </a:r>
+          </a:p>
+          <a:p>
+            <a:pPr lvl="3"/>
+            <a:r>
+              <a:rPr lang="en-US" smtClean="0"/>
+              <a:t>Fourth level</a:t>
+            </a:r>
+          </a:p>
+          <a:p>
+            <a:pPr lvl="4"/>
+            <a:r>
+              <a:rPr lang="en-US" smtClean="0"/>
+              <a:t>Fifth level</a:t>
+            </a:r>
+            <a:endParaRPr lang="en-US"/>
+          </a:p>
+        </p:txBody>
+      </p:sp>
+      <p:sp>
+        <p:nvSpPr>
+          <p:cNvPr id="6" name="Footer Placeholder 5"/>
+          <p:cNvSpPr>
+            <a:spLocks noGrp="1"/>
+          </p:cNvSpPr>
+          <p:nvPr>
+            <p:ph type="ftr" sz="quarter" idx="4"/>
+          </p:nvPr>
+        </p:nvSpPr>
+        <p:spPr>
+          <a:xfrm>
+            <a:off x="0" y="8685213"/>
+            <a:ext cx="2971800" cy="458787"/>
+          </a:xfrm>
+          <a:prstGeom prst="rect">
+            <a:avLst/>
+          </a:prstGeom>
+        </p:spPr>
+        <p:txBody>
+          <a:bodyPr vert="horz" lIns="91440" tIns="45720" rIns="91440" bIns="45720" rtlCol="0" anchor="b"/>
+          <a:lstStyle>
+            <a:lvl1pPr algn="l">
+              <a:defRPr sz="1200"/>
+            </a:lvl1pPr>
+          </a:lstStyle>
+          <a:p>
+            <a:endParaRPr lang="en-US"/>
+          </a:p>
+        </p:txBody>
+      </p:sp>
+      <p:sp>
+        <p:nvSpPr>
+          <p:cNvPr id="7" name="Slide Number Placeholder 6"/>
+          <p:cNvSpPr>
+            <a:spLocks noGrp="1"/>
+          </p:cNvSpPr>
+          <p:nvPr>
+            <p:ph type="sldNum" sz="quarter" idx="5"/>
+          </p:nvPr>
+        </p:nvSpPr>
+        <p:spPr>
+          <a:xfrm>
+            <a:off x="3884613" y="8685213"/>
+            <a:ext cx="2971800" cy="458787"/>
+          </a:xfrm>
+          <a:prstGeom prst="rect">
+            <a:avLst/>
+          </a:prstGeom>
+        </p:spPr>
+        <p:txBody>
+          <a:bodyPr vert="horz" lIns="91440" tIns="45720" rIns="91440" bIns="45720" rtlCol="0" anchor="b"/>
+          <a:lstStyle>
+            <a:lvl1pPr algn="r">
+              <a:defRPr sz="1200"/>
+            </a:lvl1pPr>
+          </a:lstStyle>
+          <a:p>
+            <a:fld id="{91882F32-2AA1-AB4C-A957-83DB65EFD37A}" type="slidenum">
+              <a:rPr lang="en-US" smtClean="0"/>
+              <a:t>‹#›</a:t>
+            </a:fld>
+            <a:endParaRPr lang="en-US"/>
+          </a:p>
+        </p:txBody>
+      </p:sp>
+    </p:spTree>
+    <p:extLst>
+      <p:ext uri="{BB962C8B-B14F-4D97-AF65-F5344CB8AC3E}">
+        <p14:creationId xmlns:p14="http://schemas.microsoft.com/office/powerpoint/2010/main" val="1803639382"/>
+      </p:ext>
+    </p:extLst>
+  </p:cSld>
+  <p:clrMap bg1="lt1" tx1="dk1" bg2="lt2" tx2="dk2" accent1="accent1" accent2="accent2" accent3="accent3" accent4="accent4" accent5="accent5" accent6="accent6" hlink="hlink" folHlink="folHlink"/>
+  <p:notesStyle>
+    <a:lvl1pPr marL="0" algn="l" defTabSz="914400" rtl="0" eaLnBrk="1" latinLnBrk="0" hangingPunct="1">
+      <a:defRPr sz="1200" kern="1200">
+        <a:solidFill>
+          <a:schemeClr val="tx1"/>
+        </a:solidFill>
+        <a:latin typeface="+mn-lt"/>
+        <a:ea typeface="+mn-ea"/>
+        <a:cs typeface="+mn-cs"/>
+      </a:defRPr>
+    </a:lvl1pPr>
+    <a:lvl2pPr marL="457200" algn="l" defTabSz="914400" rtl="0" eaLnBrk="1" latinLnBrk="0" hangingPunct="1">
+      <a:defRPr sz="1200" kern="1200">
+        <a:solidFill>
+          <a:schemeClr val="tx1"/>
+        </a:solidFill>
+        <a:latin typeface="+mn-lt"/>
+        <a:ea typeface="+mn-ea"/>
+        <a:cs typeface="+mn-cs"/>
+      </a:defRPr>
+    </a:lvl2pPr>
+    <a:lvl3pPr marL="914400" algn="l" defTabSz="914400" rtl="0" eaLnBrk="1" latinLnBrk="0" hangingPunct="1">
+      <a:defRPr sz="1200" kern="1200">
+        <a:solidFill>
+          <a:schemeClr val="tx1"/>
+        </a:solidFill>
+        <a:latin typeface="+mn-lt"/>
+        <a:ea typeface="+mn-ea"/>
+        <a:cs typeface="+mn-cs"/>
+      </a:defRPr>
+    </a:lvl3pPr>
+    <a:lvl4pPr marL="1371600" algn="l" defTabSz="914400" rtl="0" eaLnBrk="1" latinLnBrk="0" hangingPunct="1">
+      <a:defRPr sz="1200" kern="1200">
+        <a:solidFill>
+          <a:schemeClr val="tx1"/>
+        </a:solidFill>
+        <a:latin typeface="+mn-lt"/>
+        <a:ea typeface="+mn-ea"/>
+        <a:cs typeface="+mn-cs"/>
+      </a:defRPr>
+    </a:lvl4pPr>
+    <a:lvl5pPr marL="1828800" algn="l" defTabSz="914400" rtl="0" eaLnBrk="1" latinLnBrk="0" hangingPunct="1">
+      <a:defRPr sz="1200" kern="1200">
+        <a:solidFill>
+          <a:schemeClr val="tx1"/>
+        </a:solidFill>
+        <a:latin typeface="+mn-lt"/>
+        <a:ea typeface="+mn-ea"/>
+        <a:cs typeface="+mn-cs"/>
+      </a:defRPr>
+    </a:lvl5pPr>
+    <a:lvl6pPr marL="2286000" algn="l" defTabSz="914400" rtl="0" eaLnBrk="1" latinLnBrk="0" hangingPunct="1">
+      <a:defRPr sz="1200" kern="1200">
+        <a:solidFill>
+          <a:schemeClr val="tx1"/>
+        </a:solidFill>
+        <a:latin typeface="+mn-lt"/>
+        <a:ea typeface="+mn-ea"/>
+        <a:cs typeface="+mn-cs"/>
+      </a:defRPr>
+    </a:lvl6pPr>
+    <a:lvl7pPr marL="2743200" algn="l" defTabSz="914400" rtl="0" eaLnBrk="1" latinLnBrk="0" hangingPunct="1">
+      <a:defRPr sz="1200" kern="1200">
+        <a:solidFill>
+          <a:schemeClr val="tx1"/>
+        </a:solidFill>
+        <a:latin typeface="+mn-lt"/>
+        <a:ea typeface="+mn-ea"/>
+        <a:cs typeface="+mn-cs"/>
+      </a:defRPr>
+    </a:lvl7pPr>
+    <a:lvl8pPr marL="3200400" algn="l" defTabSz="914400" rtl="0" eaLnBrk="1" latinLnBrk="0" hangingPunct="1">
+      <a:defRPr sz="1200" kern="1200">
+        <a:solidFill>
+          <a:schemeClr val="tx1"/>
+        </a:solidFill>
+        <a:latin typeface="+mn-lt"/>
+        <a:ea typeface="+mn-ea"/>
+        <a:cs typeface="+mn-cs"/>
+      </a:defRPr>
+    </a:lvl8pPr>
+    <a:lvl9pPr marL="3657600" algn="l" defTabSz="914400" rtl="0" eaLnBrk="1" latinLnBrk="0" hangingPunct="1">
+      <a:defRPr sz="1200" kern="1200">
+        <a:solidFill>
+          <a:schemeClr val="tx1"/>
+        </a:solidFill>
+        <a:latin typeface="+mn-lt"/>
+        <a:ea typeface="+mn-ea"/>
+        <a:cs typeface="+mn-cs"/>
+      </a:defRPr>
+    </a:lvl9pPr>
+  </p:notesStyle>
+</p:notesMaster>
+</file>
+
+<file path=ppt/notesSlides/notesSlide1.xml><?xml version="1.0" encoding="utf-8"?>
+<p:notes xmlns:a="http://schemas.openxmlformats.org/drawingml/2006/main" xmlns:r="http://schemas.openxmlformats.org/officeDocument/2006/relationships" xmlns:p="http://schemas.openxmlformats.org/presentationml/2006/main">
+  <p:cSld>
+    <p:spTree>
+      <p:nvGrpSpPr>
+        <p:cNvPr id="1" name=""/>
+        <p:cNvGrpSpPr/>
+        <p:nvPr/>
+      </p:nvGrpSpPr>
+      <p:grpSpPr>
+        <a:xfrm>
+          <a:off x="0" y="0"/>
+          <a:ext cx="0" cy="0"/>
+          <a:chOff x="0" y="0"/>
+          <a:chExt cx="0" cy="0"/>
+        </a:xfrm>
+      </p:grpSpPr>
+      <p:sp>
+        <p:nvSpPr>
+          <p:cNvPr id="2" name="Slide Image Placeholder 1"/>
+          <p:cNvSpPr>
+            <a:spLocks noGrp="1" noRot="1" noChangeAspect="1"/>
+          </p:cNvSpPr>
+          <p:nvPr>
+            <p:ph type="sldImg"/>
+          </p:nvPr>
+        </p:nvSpPr>
+        <p:spPr/>
+      </p:sp>
+      <p:sp>
+        <p:nvSpPr>
+          <p:cNvPr id="3" name="Notes Placeholder 2"/>
+          <p:cNvSpPr>
+            <a:spLocks noGrp="1"/>
+          </p:cNvSpPr>
+          <p:nvPr>
+            <p:ph type="body" idx="1"/>
+          </p:nvPr>
+        </p:nvSpPr>
+        <p:spPr/>
+        <p:txBody>
+          <a:bodyPr/>
+          <a:lstStyle/>
+          <a:p>
+            <a:endParaRPr lang="en-US" dirty="0"/>
+          </a:p>
+        </p:txBody>
+      </p:sp>
+      <p:sp>
+        <p:nvSpPr>
+          <p:cNvPr id="4" name="Slide Number Placeholder 3"/>
+          <p:cNvSpPr>
+            <a:spLocks noGrp="1"/>
+          </p:cNvSpPr>
+          <p:nvPr>
+            <p:ph type="sldNum" sz="quarter" idx="10"/>
+          </p:nvPr>
+        </p:nvSpPr>
+        <p:spPr/>
+        <p:txBody>
+          <a:bodyPr/>
+          <a:lstStyle/>
+          <a:p>
+            <a:fld id="{91882F32-2AA1-AB4C-A957-83DB65EFD37A}" type="slidenum">
+              <a:rPr lang="en-US" smtClean="0"/>
+              <a:t>1</a:t>
+            </a:fld>
+            <a:endParaRPr lang="en-US"/>
+          </a:p>
+        </p:txBody>
+      </p:sp>
+    </p:spTree>
+    <p:extLst>
+      <p:ext uri="{BB962C8B-B14F-4D97-AF65-F5344CB8AC3E}">
+        <p14:creationId xmlns:p14="http://schemas.microsoft.com/office/powerpoint/2010/main" val="2035415869"/>
+      </p:ext>
+    </p:extLst>
+  </p:cSld>
+  <p:clrMapOvr>
+    <a:masterClrMapping/>
+  </p:clrMapOvr>
+</p:notes>
 </file>
 
 <file path=ppt/slideLayouts/slideLayout1.xml><?xml version="1.0" encoding="utf-8"?>
@@ -149,7 +676,7 @@
           </a:lstStyle>
           <a:p>
             <a:r>
-              <a:rPr lang="en-US" smtClean="0"/>
+              <a:rPr lang="en-US"/>
               <a:t>Click to edit Master title style</a:t>
             </a:r>
             <a:endParaRPr lang="en-US" dirty="0"/>
@@ -214,7 +741,7 @@
           </a:lstStyle>
           <a:p>
             <a:r>
-              <a:rPr lang="en-US" smtClean="0"/>
+              <a:rPr lang="en-US"/>
               <a:t>Click to edit Master subtitle style</a:t>
             </a:r>
             <a:endParaRPr lang="en-US" dirty="0"/>
@@ -238,7 +765,7 @@
           <a:p>
             <a:fld id="{E7F9974C-CEF4-5B4A-835A-19F97B23F348}" type="datetimeFigureOut">
               <a:rPr lang="en-US" smtClean="0"/>
-              <a:t>5/5/20</a:t>
+              <a:t>5/6/20</a:t>
             </a:fld>
             <a:endParaRPr lang="en-US"/>
           </a:p>
@@ -327,7 +854,7 @@
           <a:lstStyle/>
           <a:p>
             <a:r>
-              <a:rPr lang="en-US" smtClean="0"/>
+              <a:rPr lang="en-US"/>
               <a:t>Click to edit Master title style</a:t>
             </a:r>
             <a:endParaRPr lang="en-US" dirty="0"/>
@@ -351,35 +878,35 @@
           <a:p>
             <a:pPr lvl="0"/>
             <a:r>
-              <a:rPr lang="en-US" smtClean="0"/>
+              <a:rPr lang="en-US"/>
               <a:t>Click to edit Master text styles</a:t>
             </a:r>
           </a:p>
           <a:p>
             <a:pPr lvl="1"/>
             <a:r>
-              <a:rPr lang="en-US" smtClean="0"/>
+              <a:rPr lang="en-US"/>
               <a:t>Second level</a:t>
             </a:r>
           </a:p>
           <a:p>
             <a:pPr lvl="2"/>
             <a:r>
-              <a:rPr lang="en-US" smtClean="0"/>
+              <a:rPr lang="en-US"/>
               <a:t>Third level</a:t>
             </a:r>
           </a:p>
           <a:p>
             <a:pPr lvl="3"/>
             <a:r>
-              <a:rPr lang="en-US" smtClean="0"/>
+              <a:rPr lang="en-US"/>
               <a:t>Fourth level</a:t>
             </a:r>
           </a:p>
           <a:p>
             <a:pPr lvl="4"/>
             <a:r>
-              <a:rPr lang="en-US" smtClean="0"/>
+              <a:rPr lang="en-US"/>
               <a:t>Fifth level</a:t>
             </a:r>
             <a:endParaRPr lang="en-US" dirty="0"/>
@@ -403,7 +930,7 @@
           <a:p>
             <a:fld id="{E7F9974C-CEF4-5B4A-835A-19F97B23F348}" type="datetimeFigureOut">
               <a:rPr lang="en-US" smtClean="0"/>
-              <a:t>5/5/20</a:t>
+              <a:t>5/6/20</a:t>
             </a:fld>
             <a:endParaRPr lang="en-US"/>
           </a:p>
@@ -497,7 +1024,7 @@
           <a:lstStyle/>
           <a:p>
             <a:r>
-              <a:rPr lang="en-US" smtClean="0"/>
+              <a:rPr lang="en-US"/>
               <a:t>Click to edit Master title style</a:t>
             </a:r>
             <a:endParaRPr lang="en-US" dirty="0"/>
@@ -526,35 +1053,35 @@
           <a:p>
             <a:pPr lvl="0"/>
             <a:r>
-              <a:rPr lang="en-US" smtClean="0"/>
+              <a:rPr lang="en-US"/>
               <a:t>Click to edit Master text styles</a:t>
             </a:r>
           </a:p>
           <a:p>
             <a:pPr lvl="1"/>
             <a:r>
-              <a:rPr lang="en-US" smtClean="0"/>
+              <a:rPr lang="en-US"/>
               <a:t>Second level</a:t>
             </a:r>
           </a:p>
           <a:p>
             <a:pPr lvl="2"/>
             <a:r>
-              <a:rPr lang="en-US" smtClean="0"/>
+              <a:rPr lang="en-US"/>
               <a:t>Third level</a:t>
             </a:r>
           </a:p>
           <a:p>
             <a:pPr lvl="3"/>
             <a:r>
-              <a:rPr lang="en-US" smtClean="0"/>
+              <a:rPr lang="en-US"/>
               <a:t>Fourth level</a:t>
             </a:r>
           </a:p>
           <a:p>
             <a:pPr lvl="4"/>
             <a:r>
-              <a:rPr lang="en-US" smtClean="0"/>
+              <a:rPr lang="en-US"/>
               <a:t>Fifth level</a:t>
             </a:r>
             <a:endParaRPr lang="en-US" dirty="0"/>
@@ -578,7 +1105,7 @@
           <a:p>
             <a:fld id="{E7F9974C-CEF4-5B4A-835A-19F97B23F348}" type="datetimeFigureOut">
               <a:rPr lang="en-US" smtClean="0"/>
-              <a:t>5/5/20</a:t>
+              <a:t>5/6/20</a:t>
             </a:fld>
             <a:endParaRPr lang="en-US"/>
           </a:p>
@@ -667,7 +1194,7 @@
           <a:lstStyle/>
           <a:p>
             <a:r>
-              <a:rPr lang="en-US" smtClean="0"/>
+              <a:rPr lang="en-US"/>
               <a:t>Click to edit Master title style</a:t>
             </a:r>
             <a:endParaRPr lang="en-US" dirty="0"/>
@@ -691,35 +1218,35 @@
           <a:p>
             <a:pPr lvl="0"/>
             <a:r>
-              <a:rPr lang="en-US" smtClean="0"/>
+              <a:rPr lang="en-US"/>
               <a:t>Click to edit Master text styles</a:t>
             </a:r>
           </a:p>
           <a:p>
             <a:pPr lvl="1"/>
             <a:r>
-              <a:rPr lang="en-US" smtClean="0"/>
+              <a:rPr lang="en-US"/>
               <a:t>Second level</a:t>
             </a:r>
           </a:p>
           <a:p>
             <a:pPr lvl="2"/>
             <a:r>
-              <a:rPr lang="en-US" smtClean="0"/>
+              <a:rPr lang="en-US"/>
               <a:t>Third level</a:t>
             </a:r>
           </a:p>
           <a:p>
             <a:pPr lvl="3"/>
             <a:r>
-              <a:rPr lang="en-US" smtClean="0"/>
+              <a:rPr lang="en-US"/>
               <a:t>Fourth level</a:t>
             </a:r>
           </a:p>
           <a:p>
             <a:pPr lvl="4"/>
             <a:r>
-              <a:rPr lang="en-US" smtClean="0"/>
+              <a:rPr lang="en-US"/>
               <a:t>Fifth level</a:t>
             </a:r>
             <a:endParaRPr lang="en-US" dirty="0"/>
@@ -743,7 +1270,7 @@
           <a:p>
             <a:fld id="{E7F9974C-CEF4-5B4A-835A-19F97B23F348}" type="datetimeFigureOut">
               <a:rPr lang="en-US" smtClean="0"/>
-              <a:t>5/5/20</a:t>
+              <a:t>5/6/20</a:t>
             </a:fld>
             <a:endParaRPr lang="en-US"/>
           </a:p>
@@ -841,7 +1368,7 @@
           </a:lstStyle>
           <a:p>
             <a:r>
-              <a:rPr lang="en-US" smtClean="0"/>
+              <a:rPr lang="en-US"/>
               <a:t>Click to edit Master title style</a:t>
             </a:r>
             <a:endParaRPr lang="en-US" dirty="0"/>
@@ -959,7 +1486,7 @@
           <a:p>
             <a:pPr lvl="0"/>
             <a:r>
-              <a:rPr lang="en-US" smtClean="0"/>
+              <a:rPr lang="en-US"/>
               <a:t>Click to edit Master text styles</a:t>
             </a:r>
           </a:p>
@@ -982,7 +1509,7 @@
           <a:p>
             <a:fld id="{E7F9974C-CEF4-5B4A-835A-19F97B23F348}" type="datetimeFigureOut">
               <a:rPr lang="en-US" smtClean="0"/>
-              <a:t>5/5/20</a:t>
+              <a:t>5/6/20</a:t>
             </a:fld>
             <a:endParaRPr lang="en-US"/>
           </a:p>
@@ -1071,7 +1598,7 @@
           <a:lstStyle/>
           <a:p>
             <a:r>
-              <a:rPr lang="en-US" smtClean="0"/>
+              <a:rPr lang="en-US"/>
               <a:t>Click to edit Master title style</a:t>
             </a:r>
             <a:endParaRPr lang="en-US" dirty="0"/>
@@ -1100,35 +1627,35 @@
           <a:p>
             <a:pPr lvl="0"/>
             <a:r>
-              <a:rPr lang="en-US" smtClean="0"/>
+              <a:rPr lang="en-US"/>
               <a:t>Click to edit Master text styles</a:t>
             </a:r>
           </a:p>
           <a:p>
             <a:pPr lvl="1"/>
             <a:r>
-              <a:rPr lang="en-US" smtClean="0"/>
+              <a:rPr lang="en-US"/>
               <a:t>Second level</a:t>
             </a:r>
           </a:p>
           <a:p>
             <a:pPr lvl="2"/>
             <a:r>
-              <a:rPr lang="en-US" smtClean="0"/>
+              <a:rPr lang="en-US"/>
               <a:t>Third level</a:t>
             </a:r>
           </a:p>
           <a:p>
             <a:pPr lvl="3"/>
             <a:r>
-              <a:rPr lang="en-US" smtClean="0"/>
+              <a:rPr lang="en-US"/>
               <a:t>Fourth level</a:t>
             </a:r>
           </a:p>
           <a:p>
             <a:pPr lvl="4"/>
             <a:r>
-              <a:rPr lang="en-US" smtClean="0"/>
+              <a:rPr lang="en-US"/>
               <a:t>Fifth level</a:t>
             </a:r>
             <a:endParaRPr lang="en-US" dirty="0"/>
@@ -1157,35 +1684,35 @@
           <a:p>
             <a:pPr lvl="0"/>
             <a:r>
-              <a:rPr lang="en-US" smtClean="0"/>
+              <a:rPr lang="en-US"/>
               <a:t>Click to edit Master text styles</a:t>
             </a:r>
           </a:p>
           <a:p>
             <a:pPr lvl="1"/>
             <a:r>
-              <a:rPr lang="en-US" smtClean="0"/>
+              <a:rPr lang="en-US"/>
               <a:t>Second level</a:t>
             </a:r>
           </a:p>
           <a:p>
             <a:pPr lvl="2"/>
             <a:r>
-              <a:rPr lang="en-US" smtClean="0"/>
+              <a:rPr lang="en-US"/>
               <a:t>Third level</a:t>
             </a:r>
           </a:p>
           <a:p>
             <a:pPr lvl="3"/>
             <a:r>
-              <a:rPr lang="en-US" smtClean="0"/>
+              <a:rPr lang="en-US"/>
               <a:t>Fourth level</a:t>
             </a:r>
           </a:p>
           <a:p>
             <a:pPr lvl="4"/>
             <a:r>
-              <a:rPr lang="en-US" smtClean="0"/>
+              <a:rPr lang="en-US"/>
               <a:t>Fifth level</a:t>
             </a:r>
             <a:endParaRPr lang="en-US" dirty="0"/>
@@ -1209,7 +1736,7 @@
           <a:p>
             <a:fld id="{E7F9974C-CEF4-5B4A-835A-19F97B23F348}" type="datetimeFigureOut">
               <a:rPr lang="en-US" smtClean="0"/>
-              <a:t>5/5/20</a:t>
+              <a:t>5/6/20</a:t>
             </a:fld>
             <a:endParaRPr lang="en-US"/>
           </a:p>
@@ -1303,7 +1830,7 @@
           <a:lstStyle/>
           <a:p>
             <a:r>
-              <a:rPr lang="en-US" smtClean="0"/>
+              <a:rPr lang="en-US"/>
               <a:t>Click to edit Master title style</a:t>
             </a:r>
             <a:endParaRPr lang="en-US" dirty="0"/>
@@ -1369,7 +1896,7 @@
           <a:p>
             <a:pPr lvl="0"/>
             <a:r>
-              <a:rPr lang="en-US" smtClean="0"/>
+              <a:rPr lang="en-US"/>
               <a:t>Click to edit Master text styles</a:t>
             </a:r>
           </a:p>
@@ -1397,35 +1924,35 @@
           <a:p>
             <a:pPr lvl="0"/>
             <a:r>
-              <a:rPr lang="en-US" smtClean="0"/>
+              <a:rPr lang="en-US"/>
               <a:t>Click to edit Master text styles</a:t>
             </a:r>
           </a:p>
           <a:p>
             <a:pPr lvl="1"/>
             <a:r>
-              <a:rPr lang="en-US" smtClean="0"/>
+              <a:rPr lang="en-US"/>
               <a:t>Second level</a:t>
             </a:r>
           </a:p>
           <a:p>
             <a:pPr lvl="2"/>
             <a:r>
-              <a:rPr lang="en-US" smtClean="0"/>
+              <a:rPr lang="en-US"/>
               <a:t>Third level</a:t>
             </a:r>
           </a:p>
           <a:p>
             <a:pPr lvl="3"/>
             <a:r>
-              <a:rPr lang="en-US" smtClean="0"/>
+              <a:rPr lang="en-US"/>
               <a:t>Fourth level</a:t>
             </a:r>
           </a:p>
           <a:p>
             <a:pPr lvl="4"/>
             <a:r>
-              <a:rPr lang="en-US" smtClean="0"/>
+              <a:rPr lang="en-US"/>
               <a:t>Fifth level</a:t>
             </a:r>
             <a:endParaRPr lang="en-US" dirty="0"/>
@@ -1491,7 +2018,7 @@
           <a:p>
             <a:pPr lvl="0"/>
             <a:r>
-              <a:rPr lang="en-US" smtClean="0"/>
+              <a:rPr lang="en-US"/>
               <a:t>Click to edit Master text styles</a:t>
             </a:r>
           </a:p>
@@ -1519,35 +2046,35 @@
           <a:p>
             <a:pPr lvl="0"/>
             <a:r>
-              <a:rPr lang="en-US" smtClean="0"/>
+              <a:rPr lang="en-US"/>
               <a:t>Click to edit Master text styles</a:t>
             </a:r>
           </a:p>
           <a:p>
             <a:pPr lvl="1"/>
             <a:r>
-              <a:rPr lang="en-US" smtClean="0"/>
+              <a:rPr lang="en-US"/>
               <a:t>Second level</a:t>
             </a:r>
           </a:p>
           <a:p>
             <a:pPr lvl="2"/>
             <a:r>
-              <a:rPr lang="en-US" smtClean="0"/>
+              <a:rPr lang="en-US"/>
               <a:t>Third level</a:t>
             </a:r>
           </a:p>
           <a:p>
             <a:pPr lvl="3"/>
             <a:r>
-              <a:rPr lang="en-US" smtClean="0"/>
+              <a:rPr lang="en-US"/>
               <a:t>Fourth level</a:t>
             </a:r>
           </a:p>
           <a:p>
             <a:pPr lvl="4"/>
             <a:r>
-              <a:rPr lang="en-US" smtClean="0"/>
+              <a:rPr lang="en-US"/>
               <a:t>Fifth level</a:t>
             </a:r>
             <a:endParaRPr lang="en-US" dirty="0"/>
@@ -1571,7 +2098,7 @@
           <a:p>
             <a:fld id="{E7F9974C-CEF4-5B4A-835A-19F97B23F348}" type="datetimeFigureOut">
               <a:rPr lang="en-US" smtClean="0"/>
-              <a:t>5/5/20</a:t>
+              <a:t>5/6/20</a:t>
             </a:fld>
             <a:endParaRPr lang="en-US"/>
           </a:p>
@@ -1660,7 +2187,7 @@
           <a:lstStyle/>
           <a:p>
             <a:r>
-              <a:rPr lang="en-US" smtClean="0"/>
+              <a:rPr lang="en-US"/>
               <a:t>Click to edit Master title style</a:t>
             </a:r>
             <a:endParaRPr lang="en-US" dirty="0"/>
@@ -1684,7 +2211,7 @@
           <a:p>
             <a:fld id="{E7F9974C-CEF4-5B4A-835A-19F97B23F348}" type="datetimeFigureOut">
               <a:rPr lang="en-US" smtClean="0"/>
-              <a:t>5/5/20</a:t>
+              <a:t>5/6/20</a:t>
             </a:fld>
             <a:endParaRPr lang="en-US"/>
           </a:p>
@@ -1774,7 +2301,7 @@
           <a:p>
             <a:fld id="{E7F9974C-CEF4-5B4A-835A-19F97B23F348}" type="datetimeFigureOut">
               <a:rPr lang="en-US" smtClean="0"/>
-              <a:t>5/5/20</a:t>
+              <a:t>5/6/20</a:t>
             </a:fld>
             <a:endParaRPr lang="en-US"/>
           </a:p>
@@ -1872,7 +2399,7 @@
           </a:lstStyle>
           <a:p>
             <a:r>
-              <a:rPr lang="en-US" smtClean="0"/>
+              <a:rPr lang="en-US"/>
               <a:t>Click to edit Master title style</a:t>
             </a:r>
             <a:endParaRPr lang="en-US" dirty="0"/>
@@ -1929,35 +2456,35 @@
           <a:p>
             <a:pPr lvl="0"/>
             <a:r>
-              <a:rPr lang="en-US" smtClean="0"/>
+              <a:rPr lang="en-US"/>
               <a:t>Click to edit Master text styles</a:t>
             </a:r>
           </a:p>
           <a:p>
             <a:pPr lvl="1"/>
             <a:r>
-              <a:rPr lang="en-US" smtClean="0"/>
+              <a:rPr lang="en-US"/>
               <a:t>Second level</a:t>
             </a:r>
           </a:p>
           <a:p>
             <a:pPr lvl="2"/>
             <a:r>
-              <a:rPr lang="en-US" smtClean="0"/>
+              <a:rPr lang="en-US"/>
               <a:t>Third level</a:t>
             </a:r>
           </a:p>
           <a:p>
             <a:pPr lvl="3"/>
             <a:r>
-              <a:rPr lang="en-US" smtClean="0"/>
+              <a:rPr lang="en-US"/>
               <a:t>Fourth level</a:t>
             </a:r>
           </a:p>
           <a:p>
             <a:pPr lvl="4"/>
             <a:r>
-              <a:rPr lang="en-US" smtClean="0"/>
+              <a:rPr lang="en-US"/>
               <a:t>Fifth level</a:t>
             </a:r>
             <a:endParaRPr lang="en-US" dirty="0"/>
@@ -2023,7 +2550,7 @@
           <a:p>
             <a:pPr lvl="0"/>
             <a:r>
-              <a:rPr lang="en-US" smtClean="0"/>
+              <a:rPr lang="en-US"/>
               <a:t>Click to edit Master text styles</a:t>
             </a:r>
           </a:p>
@@ -2046,7 +2573,7 @@
           <a:p>
             <a:fld id="{E7F9974C-CEF4-5B4A-835A-19F97B23F348}" type="datetimeFigureOut">
               <a:rPr lang="en-US" smtClean="0"/>
-              <a:t>5/5/20</a:t>
+              <a:t>5/6/20</a:t>
             </a:fld>
             <a:endParaRPr lang="en-US"/>
           </a:p>
@@ -2144,7 +2671,7 @@
           </a:lstStyle>
           <a:p>
             <a:r>
-              <a:rPr lang="en-US" smtClean="0"/>
+              <a:rPr lang="en-US"/>
               <a:t>Click to edit Master title style</a:t>
             </a:r>
             <a:endParaRPr lang="en-US" dirty="0"/>
@@ -2209,7 +2736,7 @@
           </a:lstStyle>
           <a:p>
             <a:r>
-              <a:rPr lang="en-US" smtClean="0"/>
+              <a:rPr lang="en-US"/>
               <a:t>Drag picture to placeholder or click icon to add</a:t>
             </a:r>
             <a:endParaRPr lang="en-US" dirty="0"/>
@@ -2275,7 +2802,7 @@
           <a:p>
             <a:pPr lvl="0"/>
             <a:r>
-              <a:rPr lang="en-US" smtClean="0"/>
+              <a:rPr lang="en-US"/>
               <a:t>Click to edit Master text styles</a:t>
             </a:r>
           </a:p>
@@ -2298,7 +2825,7 @@
           <a:p>
             <a:fld id="{E7F9974C-CEF4-5B4A-835A-19F97B23F348}" type="datetimeFigureOut">
               <a:rPr lang="en-US" smtClean="0"/>
-              <a:t>5/5/20</a:t>
+              <a:t>5/6/20</a:t>
             </a:fld>
             <a:endParaRPr lang="en-US"/>
           </a:p>
@@ -2402,7 +2929,7 @@
           <a:lstStyle/>
           <a:p>
             <a:r>
-              <a:rPr lang="en-US" smtClean="0"/>
+              <a:rPr lang="en-US"/>
               <a:t>Click to edit Master title style</a:t>
             </a:r>
             <a:endParaRPr lang="en-US" dirty="0"/>
@@ -2436,35 +2963,35 @@
           <a:p>
             <a:pPr lvl="0"/>
             <a:r>
-              <a:rPr lang="en-US" smtClean="0"/>
+              <a:rPr lang="en-US"/>
               <a:t>Click to edit Master text styles</a:t>
             </a:r>
           </a:p>
           <a:p>
             <a:pPr lvl="1"/>
             <a:r>
-              <a:rPr lang="en-US" smtClean="0"/>
+              <a:rPr lang="en-US"/>
               <a:t>Second level</a:t>
             </a:r>
           </a:p>
           <a:p>
             <a:pPr lvl="2"/>
             <a:r>
-              <a:rPr lang="en-US" smtClean="0"/>
+              <a:rPr lang="en-US"/>
               <a:t>Third level</a:t>
             </a:r>
           </a:p>
           <a:p>
             <a:pPr lvl="3"/>
             <a:r>
-              <a:rPr lang="en-US" smtClean="0"/>
+              <a:rPr lang="en-US"/>
               <a:t>Fourth level</a:t>
             </a:r>
           </a:p>
           <a:p>
             <a:pPr lvl="4"/>
             <a:r>
-              <a:rPr lang="en-US" smtClean="0"/>
+              <a:rPr lang="en-US"/>
               <a:t>Fifth level</a:t>
             </a:r>
             <a:endParaRPr lang="en-US" dirty="0"/>
@@ -2506,7 +3033,7 @@
           <a:p>
             <a:fld id="{E7F9974C-CEF4-5B4A-835A-19F97B23F348}" type="datetimeFigureOut">
               <a:rPr lang="en-US" smtClean="0"/>
-              <a:t>5/5/20</a:t>
+              <a:t>5/6/20</a:t>
             </a:fld>
             <a:endParaRPr lang="en-US"/>
           </a:p>
@@ -2920,7 +3447,7 @@
           <p:nvPr/>
         </p:nvPicPr>
         <p:blipFill>
-          <a:blip r:embed="rId2">
+          <a:blip r:embed="rId3">
             <a:extLst>
               <a:ext uri="{28A0092B-C50C-407E-A947-70E740481C1C}">
                 <a14:useLocalDpi xmlns:a14="http://schemas.microsoft.com/office/drawing/2010/main" val="0"/>
@@ -2950,7 +3477,7 @@
           <p:nvPr/>
         </p:nvPicPr>
         <p:blipFill>
-          <a:blip r:embed="rId2">
+          <a:blip r:embed="rId3">
             <a:extLst>
               <a:ext uri="{28A0092B-C50C-407E-A947-70E740481C1C}">
                 <a14:useLocalDpi xmlns:a14="http://schemas.microsoft.com/office/drawing/2010/main" val="0"/>
@@ -2980,7 +3507,7 @@
         <p:spPr>
           <a:xfrm>
             <a:off x="1705610" y="8620760"/>
-            <a:ext cx="12440158" cy="1498600"/>
+            <a:ext cx="10268676" cy="1498600"/>
           </a:xfrm>
           <a:prstGeom prst="rect">
             <a:avLst/>
@@ -3034,8 +3561,8 @@
         </p:nvSpPr>
         <p:spPr>
           <a:xfrm>
-            <a:off x="31226760" y="8620760"/>
-            <a:ext cx="11050270" cy="1498600"/>
+            <a:off x="31979886" y="8620760"/>
+            <a:ext cx="10297144" cy="1498600"/>
           </a:xfrm>
           <a:prstGeom prst="rect">
             <a:avLst/>
@@ -3137,7 +3664,7 @@
         </p:nvSpPr>
         <p:spPr>
           <a:xfrm>
-            <a:off x="16367760" y="8620760"/>
+            <a:off x="12482023" y="8611327"/>
             <a:ext cx="12637008" cy="1498600"/>
           </a:xfrm>
           <a:prstGeom prst="rect">
@@ -3193,7 +3720,7 @@
         <p:spPr>
           <a:xfrm>
             <a:off x="1705610" y="10058400"/>
-            <a:ext cx="12440158" cy="5882640"/>
+            <a:ext cx="10268676" cy="5882640"/>
           </a:xfrm>
           <a:prstGeom prst="frame">
             <a:avLst>
@@ -3246,8 +3773,8 @@
         </p:nvSpPr>
         <p:spPr>
           <a:xfrm>
-            <a:off x="31226760" y="16678757"/>
-            <a:ext cx="11050270" cy="1498600"/>
+            <a:off x="31979886" y="16678757"/>
+            <a:ext cx="10297144" cy="1498600"/>
           </a:xfrm>
           <a:prstGeom prst="rect">
             <a:avLst/>
@@ -3301,8 +3828,8 @@
         </p:nvSpPr>
         <p:spPr>
           <a:xfrm>
-            <a:off x="31226760" y="18188940"/>
-            <a:ext cx="11050270" cy="11892280"/>
+            <a:off x="31979886" y="18188940"/>
+            <a:ext cx="10297144" cy="11892280"/>
           </a:xfrm>
           <a:prstGeom prst="frame">
             <a:avLst>
@@ -3355,8 +3882,8 @@
         </p:nvSpPr>
         <p:spPr>
           <a:xfrm>
-            <a:off x="31226760" y="10114280"/>
-            <a:ext cx="11050270" cy="5826760"/>
+            <a:off x="31979886" y="10114280"/>
+            <a:ext cx="10297144" cy="5887720"/>
           </a:xfrm>
           <a:prstGeom prst="frame">
             <a:avLst>
@@ -3409,8 +3936,8 @@
         </p:nvSpPr>
         <p:spPr>
           <a:xfrm>
-            <a:off x="1705610" y="16690340"/>
-            <a:ext cx="27299158" cy="1498600"/>
+            <a:off x="1705609" y="16690340"/>
+            <a:ext cx="29766539" cy="1498600"/>
           </a:xfrm>
           <a:prstGeom prst="rect">
             <a:avLst/>
@@ -3464,8 +3991,8 @@
         </p:nvSpPr>
         <p:spPr>
           <a:xfrm>
-            <a:off x="1705610" y="18188940"/>
-            <a:ext cx="27299158" cy="11892280"/>
+            <a:off x="1705609" y="18188940"/>
+            <a:ext cx="29766540" cy="11892280"/>
           </a:xfrm>
           <a:prstGeom prst="frame">
             <a:avLst>
@@ -3518,7 +4045,7 @@
         </p:nvSpPr>
         <p:spPr>
           <a:xfrm>
-            <a:off x="16367760" y="10058400"/>
+            <a:off x="12482023" y="10048967"/>
             <a:ext cx="12637008" cy="5882640"/>
           </a:xfrm>
           <a:prstGeom prst="frame">
@@ -3572,7 +4099,7 @@
         </p:nvSpPr>
         <p:spPr>
           <a:xfrm>
-            <a:off x="18962433" y="8765439"/>
+            <a:off x="15076696" y="8756006"/>
             <a:ext cx="7264781" cy="1209242"/>
           </a:xfrm>
           <a:prstGeom prst="rect">
@@ -3587,10 +4114,9 @@
           <a:lstStyle/>
           <a:p>
             <a:r>
-              <a:rPr lang="en-US" b="1" dirty="0" smtClean="0"/>
+              <a:rPr lang="en-US" b="1" dirty="0"/>
               <a:t>Technologies Used</a:t>
             </a:r>
-            <a:endParaRPr lang="en-US" b="1" dirty="0"/>
           </a:p>
         </p:txBody>
       </p:sp>
@@ -3602,7 +4128,7 @@
         </p:nvSpPr>
         <p:spPr>
           <a:xfrm>
-            <a:off x="6393605" y="8853020"/>
+            <a:off x="5134128" y="8734959"/>
             <a:ext cx="3411640" cy="1209242"/>
           </a:xfrm>
           <a:prstGeom prst="rect">
@@ -3616,10 +4142,9 @@
           <a:lstStyle/>
           <a:p>
             <a:r>
-              <a:rPr lang="en-US" b="1" dirty="0" smtClean="0"/>
+              <a:rPr lang="en-US" b="1" dirty="0"/>
               <a:t>Abstract</a:t>
             </a:r>
-            <a:endParaRPr lang="en-US" b="1" dirty="0"/>
           </a:p>
         </p:txBody>
       </p:sp>
@@ -3631,7 +4156,7 @@
         </p:nvSpPr>
         <p:spPr>
           <a:xfrm>
-            <a:off x="32065595" y="8771942"/>
+            <a:off x="32442158" y="8771942"/>
             <a:ext cx="9372600" cy="1209242"/>
           </a:xfrm>
           <a:prstGeom prst="rect">
@@ -3646,10 +4171,9 @@
           <a:lstStyle/>
           <a:p>
             <a:r>
-              <a:rPr lang="en-US" b="1" dirty="0" smtClean="0"/>
+              <a:rPr lang="en-US" b="1" dirty="0"/>
               <a:t>Real World Applications</a:t>
             </a:r>
-            <a:endParaRPr lang="en-US" b="1" dirty="0"/>
           </a:p>
         </p:txBody>
       </p:sp>
@@ -3676,7 +4200,7 @@
           <a:lstStyle/>
           <a:p>
             <a:r>
-              <a:rPr lang="en-US" b="1" smtClean="0"/>
+              <a:rPr lang="en-US" b="1"/>
               <a:t>Conclusion</a:t>
             </a:r>
             <a:endParaRPr lang="en-US" b="1" dirty="0"/>
@@ -3691,7 +4215,7 @@
         </p:nvSpPr>
         <p:spPr>
           <a:xfrm>
-            <a:off x="13875553" y="16823436"/>
+            <a:off x="15106150" y="16880909"/>
             <a:ext cx="2959272" cy="1209242"/>
           </a:xfrm>
           <a:prstGeom prst="rect">
@@ -3705,10 +4229,9 @@
           <a:lstStyle/>
           <a:p>
             <a:r>
-              <a:rPr lang="en-US" b="1" dirty="0" smtClean="0"/>
+              <a:rPr lang="en-US" b="1" dirty="0"/>
               <a:t>Results</a:t>
             </a:r>
-            <a:endParaRPr lang="en-US" b="1" dirty="0"/>
           </a:p>
         </p:txBody>
       </p:sp>
@@ -3736,34 +4259,9 @@
           <a:p>
             <a:pPr algn="ctr"/>
             <a:r>
-              <a:rPr lang="en-US" b="1" dirty="0" smtClean="0"/>
-              <a:t>Increasing the Efficiency of Text </a:t>
-            </a:r>
-            <a:r>
               <a:rPr lang="en-US" b="1" dirty="0"/>
-              <a:t>A</a:t>
-            </a:r>
-            <a:r>
-              <a:rPr lang="en-US" b="1" dirty="0" smtClean="0"/>
-              <a:t>nalysis </a:t>
-            </a:r>
-            <a:r>
-              <a:rPr lang="en-US" b="1" dirty="0"/>
-              <a:t>P</a:t>
-            </a:r>
-            <a:r>
-              <a:rPr lang="en-US" b="1" dirty="0" smtClean="0"/>
-              <a:t>rograms </a:t>
-            </a:r>
-            <a:r>
-              <a:rPr lang="en-US" b="1" dirty="0"/>
-              <a:t>U</a:t>
-            </a:r>
-            <a:r>
-              <a:rPr lang="en-US" b="1" dirty="0" smtClean="0"/>
-              <a:t>sing a Multi-Tiered Approach</a:t>
-            </a:r>
-            <a:endParaRPr lang="en-US" b="1" dirty="0"/>
+              <a:t>Increasing the Efficiency of Text Analysis Programs Using a Multi-Tiered Approach</a:t>
+            </a:r>
           </a:p>
         </p:txBody>
       </p:sp>
@@ -3775,8 +4273,8 @@
         </p:nvSpPr>
         <p:spPr>
           <a:xfrm>
-            <a:off x="17249577" y="10644449"/>
-            <a:ext cx="5345246" cy="4524315"/>
+            <a:off x="13039035" y="10152082"/>
+            <a:ext cx="6268254" cy="5786199"/>
           </a:xfrm>
           <a:prstGeom prst="rect">
             <a:avLst/>
@@ -3788,6 +4286,23 @@
             <a:spAutoFit/>
           </a:bodyPr>
           <a:lstStyle/>
+          <a:p>
+            <a:pPr marL="685800" indent="-685800">
+              <a:buFont typeface="Arial" charset="0"/>
+              <a:buChar char="•"/>
+            </a:pPr>
+            <a:r>
+              <a:rPr lang="en-US" sz="3600" dirty="0" smtClean="0"/>
+              <a:t>Python</a:t>
+            </a:r>
+          </a:p>
+          <a:p>
+            <a:r>
+              <a:rPr lang="en-US" sz="2800" dirty="0" smtClean="0"/>
+              <a:t>-       Programming Language</a:t>
+            </a:r>
+            <a:endParaRPr lang="en-US" sz="2800" dirty="0"/>
+          </a:p>
           <a:p>
             <a:pPr marL="685800" indent="-685800">
               <a:lnSpc>
@@ -3797,9 +4312,26 @@
               <a:buChar char="•"/>
             </a:pPr>
             <a:r>
-              <a:rPr lang="en-US" sz="4800" dirty="0" smtClean="0"/>
-              <a:t>Python</a:t>
-            </a:r>
+              <a:rPr lang="en-US" sz="3600" dirty="0" err="1" smtClean="0"/>
+              <a:t>Jupyter</a:t>
+            </a:r>
+            <a:r>
+              <a:rPr lang="en-US" sz="3600" dirty="0" smtClean="0"/>
+              <a:t> Notebook</a:t>
+            </a:r>
+          </a:p>
+          <a:p>
+            <a:r>
+              <a:rPr lang="en-US" sz="2800" dirty="0" smtClean="0"/>
+              <a:t>-       Integrated Development </a:t>
+            </a:r>
+          </a:p>
+          <a:p>
+            <a:r>
+              <a:rPr lang="en-US" sz="2800" dirty="0" smtClean="0"/>
+              <a:t>        Environment</a:t>
+            </a:r>
+            <a:endParaRPr lang="en-US" sz="3600" dirty="0" smtClean="0"/>
           </a:p>
           <a:p>
             <a:pPr marL="685800" indent="-685800">
@@ -3810,13 +4342,21 @@
               <a:buChar char="•"/>
             </a:pPr>
             <a:r>
-              <a:rPr lang="en-US" sz="4800" dirty="0" err="1" smtClean="0"/>
-              <a:t>Jupyter</a:t>
-            </a:r>
-            <a:r>
-              <a:rPr lang="en-US" sz="4800" dirty="0" smtClean="0"/>
-              <a:t> Notebook</a:t>
-            </a:r>
+              <a:rPr lang="en-US" sz="3600" dirty="0" err="1" smtClean="0"/>
+              <a:t>Github</a:t>
+            </a:r>
+            <a:endParaRPr lang="en-US" sz="3600" dirty="0" smtClean="0"/>
+          </a:p>
+          <a:p>
+            <a:r>
+              <a:rPr lang="en-US" sz="3200" dirty="0"/>
+              <a:t>-</a:t>
+            </a:r>
+            <a:r>
+              <a:rPr lang="en-US" sz="2800" dirty="0" smtClean="0"/>
+              <a:t>       Source Code Management</a:t>
+            </a:r>
+            <a:endParaRPr lang="en-US" sz="3600" dirty="0"/>
           </a:p>
           <a:p>
             <a:pPr marL="685800" indent="-685800">
@@ -3827,10 +4367,88 @@
               <a:buChar char="•"/>
             </a:pPr>
             <a:r>
-              <a:rPr lang="en-US" sz="4800" dirty="0" err="1" smtClean="0"/>
-              <a:t>Github</a:t>
-            </a:r>
-            <a:endParaRPr lang="en-US" sz="4800" dirty="0" smtClean="0"/>
+              <a:rPr lang="en-US" sz="3600" dirty="0" smtClean="0"/>
+              <a:t>Doc2Vec</a:t>
+            </a:r>
+          </a:p>
+          <a:p>
+            <a:pPr marL="457200" indent="-457200">
+              <a:buFontTx/>
+              <a:buChar char="-"/>
+            </a:pPr>
+            <a:r>
+              <a:rPr lang="en-US" sz="2800" dirty="0" smtClean="0"/>
+              <a:t>   Natural Language Processing Python</a:t>
+            </a:r>
+            <a:endParaRPr lang="en-US" sz="2800" dirty="0"/>
+          </a:p>
+          <a:p>
+            <a:r>
+              <a:rPr lang="en-US" sz="2800" dirty="0"/>
+              <a:t> </a:t>
+            </a:r>
+            <a:r>
+              <a:rPr lang="en-US" sz="2800" dirty="0" smtClean="0"/>
+              <a:t>        </a:t>
+            </a:r>
+            <a:r>
+              <a:rPr lang="en-US" sz="2800" dirty="0" smtClean="0"/>
+              <a:t>package</a:t>
+            </a:r>
+          </a:p>
+        </p:txBody>
+      </p:sp>
+      <p:sp>
+        <p:nvSpPr>
+          <p:cNvPr id="33" name="TextBox 32"/>
+          <p:cNvSpPr txBox="1"/>
+          <p:nvPr/>
+        </p:nvSpPr>
+        <p:spPr>
+          <a:xfrm>
+            <a:off x="19248262" y="10140725"/>
+            <a:ext cx="5457648" cy="5724644"/>
+          </a:xfrm>
+          <a:prstGeom prst="rect">
+            <a:avLst/>
+          </a:prstGeom>
+          <a:noFill/>
+        </p:spPr>
+        <p:txBody>
+          <a:bodyPr wrap="none" rtlCol="0">
+            <a:spAutoFit/>
+          </a:bodyPr>
+          <a:lstStyle/>
+          <a:p>
+            <a:pPr marL="685800" indent="-685800">
+              <a:buFont typeface="Arial" charset="0"/>
+              <a:buChar char="•"/>
+            </a:pPr>
+            <a:r>
+              <a:rPr lang="en-US" sz="3600" dirty="0" smtClean="0"/>
+              <a:t>Pandas</a:t>
+            </a:r>
+          </a:p>
+          <a:p>
+            <a:pPr marL="457200" indent="-457200">
+              <a:buFontTx/>
+              <a:buChar char="-"/>
+            </a:pPr>
+            <a:r>
+              <a:rPr lang="en-US" sz="3200" dirty="0" smtClean="0"/>
+              <a:t>   </a:t>
+            </a:r>
+            <a:r>
+              <a:rPr lang="en-US" sz="2400" dirty="0" smtClean="0"/>
+              <a:t>Data manipulation Python</a:t>
+            </a:r>
+          </a:p>
+          <a:p>
+            <a:r>
+              <a:rPr lang="en-US" sz="2400" dirty="0" smtClean="0"/>
+              <a:t>           package</a:t>
+            </a:r>
+            <a:endParaRPr lang="en-US" sz="2400" dirty="0"/>
           </a:p>
           <a:p>
             <a:pPr marL="685800" indent="-685800">
@@ -3841,33 +4459,28 @@
               <a:buChar char="•"/>
             </a:pPr>
             <a:r>
-              <a:rPr lang="en-US" sz="4800" dirty="0" smtClean="0"/>
-              <a:t>Doc2Vec</a:t>
-            </a:r>
-          </a:p>
-        </p:txBody>
-      </p:sp>
-      <p:sp>
-        <p:nvSpPr>
-          <p:cNvPr id="33" name="TextBox 32"/>
-          <p:cNvSpPr txBox="1"/>
-          <p:nvPr/>
-        </p:nvSpPr>
-        <p:spPr>
-          <a:xfrm>
-            <a:off x="23127172" y="10598729"/>
-            <a:ext cx="4392549" cy="4524315"/>
-          </a:xfrm>
-          <a:prstGeom prst="rect">
-            <a:avLst/>
-          </a:prstGeom>
-          <a:noFill/>
-        </p:spPr>
-        <p:txBody>
-          <a:bodyPr wrap="none" rtlCol="0">
-            <a:spAutoFit/>
-          </a:bodyPr>
-          <a:lstStyle/>
+              <a:rPr lang="en-US" sz="3600" dirty="0" err="1" smtClean="0"/>
+              <a:t>Nltk</a:t>
+            </a:r>
+            <a:endParaRPr lang="en-US" sz="3600" dirty="0"/>
+          </a:p>
+          <a:p>
+            <a:pPr marL="457200" indent="-457200">
+              <a:buFontTx/>
+              <a:buChar char="-"/>
+            </a:pPr>
+            <a:r>
+              <a:rPr lang="en-US" sz="2800" dirty="0" smtClean="0"/>
+              <a:t>   Natural Language Tokenizer</a:t>
+            </a:r>
+          </a:p>
+          <a:p>
+            <a:r>
+              <a:rPr lang="en-US" sz="2800" dirty="0" smtClean="0"/>
+              <a:t>         Python package</a:t>
+            </a:r>
+            <a:endParaRPr lang="en-US" sz="2800" dirty="0"/>
+          </a:p>
           <a:p>
             <a:pPr marL="685800" indent="-685800">
               <a:lnSpc>
@@ -3877,9 +4490,17 @@
               <a:buChar char="•"/>
             </a:pPr>
             <a:r>
-              <a:rPr lang="en-US" sz="4800" dirty="0" smtClean="0"/>
-              <a:t>Pandas</a:t>
-            </a:r>
+              <a:rPr lang="en-US" sz="3600" dirty="0" err="1" smtClean="0"/>
+              <a:t>Sklearn</a:t>
+            </a:r>
+            <a:endParaRPr lang="en-US" sz="3600" dirty="0" smtClean="0"/>
+          </a:p>
+          <a:p>
+            <a:r>
+              <a:rPr lang="en-US" sz="2800" dirty="0" smtClean="0"/>
+              <a:t>-       Vector Analysis Python package</a:t>
+            </a:r>
+            <a:endParaRPr lang="en-US" sz="2800" dirty="0"/>
           </a:p>
           <a:p>
             <a:pPr marL="685800" indent="-685800">
@@ -3890,11 +4511,41 @@
               <a:buChar char="•"/>
             </a:pPr>
             <a:r>
-              <a:rPr lang="en-US" sz="4800" dirty="0" err="1" smtClean="0"/>
-              <a:t>nltk</a:t>
-            </a:r>
-            <a:endParaRPr lang="en-US" sz="4800" dirty="0" smtClean="0"/>
-          </a:p>
+              <a:rPr lang="en-US" sz="3600" dirty="0" err="1" smtClean="0"/>
+              <a:t>BeautifulSoup</a:t>
+            </a:r>
+            <a:endParaRPr lang="en-US" sz="3600" dirty="0" smtClean="0"/>
+          </a:p>
+          <a:p>
+            <a:r>
+              <a:rPr lang="en-US" sz="2800" dirty="0" smtClean="0"/>
+              <a:t>-       Web scraper python package</a:t>
+            </a:r>
+            <a:endParaRPr lang="en-US" sz="2800" dirty="0"/>
+          </a:p>
+        </p:txBody>
+      </p:sp>
+      <p:sp>
+        <p:nvSpPr>
+          <p:cNvPr id="34" name="TextBox 33"/>
+          <p:cNvSpPr txBox="1"/>
+          <p:nvPr/>
+        </p:nvSpPr>
+        <p:spPr>
+          <a:xfrm>
+            <a:off x="32201063" y="10204532"/>
+            <a:ext cx="5443926" cy="1003031"/>
+          </a:xfrm>
+          <a:prstGeom prst="rect">
+            <a:avLst/>
+          </a:prstGeom>
+          <a:noFill/>
+        </p:spPr>
+        <p:txBody>
+          <a:bodyPr wrap="none" rtlCol="0">
+            <a:spAutoFit/>
+          </a:bodyPr>
+          <a:lstStyle/>
           <a:p>
             <a:pPr marL="685800" indent="-685800">
               <a:lnSpc>
@@ -3904,15 +4555,163 @@
               <a:buChar char="•"/>
             </a:pPr>
             <a:r>
-              <a:rPr lang="en-US" sz="4800" dirty="0" err="1"/>
-              <a:t>s</a:t>
-            </a:r>
-            <a:r>
-              <a:rPr lang="en-US" sz="4800" dirty="0" err="1" smtClean="0"/>
-              <a:t>klearn</a:t>
-            </a:r>
-            <a:endParaRPr lang="en-US" sz="4800" dirty="0" smtClean="0"/>
-          </a:p>
+              <a:rPr lang="en-US" sz="4400" dirty="0"/>
+              <a:t>Patent Enforcement</a:t>
+            </a:r>
+          </a:p>
+        </p:txBody>
+      </p:sp>
+      <p:sp>
+        <p:nvSpPr>
+          <p:cNvPr id="35" name="TextBox 34"/>
+          <p:cNvSpPr txBox="1"/>
+          <p:nvPr/>
+        </p:nvSpPr>
+        <p:spPr>
+          <a:xfrm>
+            <a:off x="32769588" y="13792062"/>
+            <a:ext cx="9642910" cy="1569660"/>
+          </a:xfrm>
+          <a:prstGeom prst="rect">
+            <a:avLst/>
+          </a:prstGeom>
+          <a:noFill/>
+        </p:spPr>
+        <p:txBody>
+          <a:bodyPr wrap="square" rtlCol="0">
+            <a:spAutoFit/>
+          </a:bodyPr>
+          <a:lstStyle/>
+          <a:p>
+            <a:pPr marL="457200" indent="-457200">
+              <a:buFont typeface=".AppleSystemUIFont" charset="-120"/>
+              <a:buChar char="-"/>
+            </a:pPr>
+            <a:r>
+              <a:rPr lang="en-US" sz="3200" dirty="0"/>
+              <a:t>Enable universities to efficiently compare the course                                              descriptions and make a guided decision as to whether or not the credits should transfer. </a:t>
+            </a:r>
+          </a:p>
+        </p:txBody>
+      </p:sp>
+      <p:sp>
+        <p:nvSpPr>
+          <p:cNvPr id="36" name="TextBox 35"/>
+          <p:cNvSpPr txBox="1"/>
+          <p:nvPr/>
+        </p:nvSpPr>
+        <p:spPr>
+          <a:xfrm>
+            <a:off x="32769588" y="11245333"/>
+            <a:ext cx="9275879" cy="1569660"/>
+          </a:xfrm>
+          <a:prstGeom prst="rect">
+            <a:avLst/>
+          </a:prstGeom>
+          <a:noFill/>
+        </p:spPr>
+        <p:txBody>
+          <a:bodyPr wrap="square" rtlCol="0">
+            <a:spAutoFit/>
+          </a:bodyPr>
+          <a:lstStyle/>
+          <a:p>
+            <a:pPr marL="457200" indent="-457200">
+              <a:buFont typeface=".AppleSystemUIFont" charset="-120"/>
+              <a:buChar char="-"/>
+            </a:pPr>
+            <a:r>
+              <a:rPr lang="en-US" sz="3200" dirty="0"/>
+              <a:t>Patents can be compared to product descriptions quickly and efficiently allowing companies to sift through large volumes of potential infringements. </a:t>
+            </a:r>
+          </a:p>
+        </p:txBody>
+      </p:sp>
+      <p:sp>
+        <p:nvSpPr>
+          <p:cNvPr id="43" name="TextBox 42"/>
+          <p:cNvSpPr txBox="1"/>
+          <p:nvPr/>
+        </p:nvSpPr>
+        <p:spPr>
+          <a:xfrm>
+            <a:off x="32273717" y="18636657"/>
+            <a:ext cx="9834872" cy="11827533"/>
+          </a:xfrm>
+          <a:prstGeom prst="rect">
+            <a:avLst/>
+          </a:prstGeom>
+          <a:noFill/>
+        </p:spPr>
+        <p:txBody>
+          <a:bodyPr wrap="square" rtlCol="0">
+            <a:spAutoFit/>
+          </a:bodyPr>
+          <a:lstStyle/>
+          <a:p>
+            <a:r>
+              <a:rPr lang="en-US" sz="4600" dirty="0"/>
+              <a:t>This data shows that it is possible to boost efficiency in natural language processing applications using a multi-tiered approach. It also shows that this approach works best on broad sets of documents that span multiple different topics. However, it still proves to be effective for boosting efficiency on more focused data sets. This means that the approach has a wide range of potential applications in the Data Science Industry. Considerations should be made to implement a similar system in any application involved in natural language processing and text similarity analysis. </a:t>
+            </a:r>
+          </a:p>
+          <a:p>
+            <a:endParaRPr lang="en-US" dirty="0"/>
+          </a:p>
+        </p:txBody>
+      </p:sp>
+      <p:sp>
+        <p:nvSpPr>
+          <p:cNvPr id="53" name="TextBox 52"/>
+          <p:cNvSpPr txBox="1"/>
+          <p:nvPr/>
+        </p:nvSpPr>
+        <p:spPr>
+          <a:xfrm>
+            <a:off x="1913922" y="10464142"/>
+            <a:ext cx="10060364" cy="6133667"/>
+          </a:xfrm>
+          <a:prstGeom prst="rect">
+            <a:avLst/>
+          </a:prstGeom>
+          <a:noFill/>
+        </p:spPr>
+        <p:txBody>
+          <a:bodyPr wrap="square" rtlCol="0">
+            <a:spAutoFit/>
+          </a:bodyPr>
+          <a:lstStyle/>
+          <a:p>
+            <a:r>
+              <a:rPr lang="en-US" sz="3200" dirty="0"/>
+              <a:t>Natural Language Processing is an increasingly researched field that has a few major barricades holding back its progress. One of these barricades is the intensive computational costs used by its processes. The goal for this project is to explore potential efficiencies that can be gained by implementing a multi-tiered filter based analysis system. A text-analysis script was written and designed in order to prove this hypothesis. The resulting data indicates that a multi-tier approach can be successfully implemented for an increase in efficiency. </a:t>
+            </a:r>
+          </a:p>
+          <a:p>
+            <a:endParaRPr lang="en-US" dirty="0"/>
+          </a:p>
+        </p:txBody>
+      </p:sp>
+      <p:sp>
+        <p:nvSpPr>
+          <p:cNvPr id="54" name="TextBox 53"/>
+          <p:cNvSpPr txBox="1"/>
+          <p:nvPr/>
+        </p:nvSpPr>
+        <p:spPr>
+          <a:xfrm>
+            <a:off x="32201063" y="12692960"/>
+            <a:ext cx="4450193" cy="1003031"/>
+          </a:xfrm>
+          <a:prstGeom prst="rect">
+            <a:avLst/>
+          </a:prstGeom>
+          <a:noFill/>
+        </p:spPr>
+        <p:txBody>
+          <a:bodyPr wrap="none" rtlCol="0">
+            <a:spAutoFit/>
+          </a:bodyPr>
+          <a:lstStyle/>
           <a:p>
             <a:pPr marL="685800" indent="-685800">
               <a:lnSpc>
@@ -3922,23 +4721,586 @@
               <a:buChar char="•"/>
             </a:pPr>
             <a:r>
-              <a:rPr lang="en-US" sz="4800" dirty="0" err="1" smtClean="0"/>
-              <a:t>BeautifulSoup</a:t>
-            </a:r>
-            <a:endParaRPr lang="en-US" sz="4800" dirty="0" smtClean="0"/>
-          </a:p>
-        </p:txBody>
-      </p:sp>
-      <p:sp>
-        <p:nvSpPr>
-          <p:cNvPr id="34" name="TextBox 33"/>
+              <a:rPr lang="en-US" sz="4400" dirty="0"/>
+              <a:t>Credit Transfers</a:t>
+            </a:r>
+          </a:p>
+        </p:txBody>
+      </p:sp>
+      <p:sp>
+        <p:nvSpPr>
+          <p:cNvPr id="55" name="TextBox 54"/>
           <p:cNvSpPr txBox="1"/>
           <p:nvPr/>
         </p:nvSpPr>
         <p:spPr>
           <a:xfrm>
-            <a:off x="32065595" y="10204532"/>
-            <a:ext cx="5860579" cy="1085810"/>
+            <a:off x="15248192" y="6195895"/>
+            <a:ext cx="13457787" cy="923330"/>
+          </a:xfrm>
+          <a:prstGeom prst="rect">
+            <a:avLst/>
+          </a:prstGeom>
+          <a:noFill/>
+        </p:spPr>
+        <p:txBody>
+          <a:bodyPr wrap="none" rtlCol="0">
+            <a:spAutoFit/>
+          </a:bodyPr>
+          <a:lstStyle/>
+          <a:p>
+            <a:r>
+              <a:rPr lang="en-US" sz="5400" b="1" dirty="0"/>
+              <a:t>By Daniel O’Brien and </a:t>
+            </a:r>
+            <a:r>
+              <a:rPr lang="en-US" sz="5400" b="1" dirty="0" smtClean="0"/>
+              <a:t>Advisor Michael </a:t>
+            </a:r>
+            <a:r>
+              <a:rPr lang="en-US" sz="5400" b="1" dirty="0" err="1"/>
+              <a:t>Gildein</a:t>
+            </a:r>
+            <a:endParaRPr lang="en-US" sz="7200" b="1" dirty="0"/>
+          </a:p>
+        </p:txBody>
+      </p:sp>
+      <p:pic>
+        <p:nvPicPr>
+          <p:cNvPr id="2" name="Picture 1"/>
+          <p:cNvPicPr>
+            <a:picLocks noChangeAspect="1"/>
+          </p:cNvPicPr>
+          <p:nvPr/>
+        </p:nvPicPr>
+        <p:blipFill>
+          <a:blip r:embed="rId4">
+            <a:extLst>
+              <a:ext uri="{28A0092B-C50C-407E-A947-70E740481C1C}">
+                <a14:useLocalDpi xmlns:a14="http://schemas.microsoft.com/office/drawing/2010/main" val="0"/>
+              </a:ext>
+            </a:extLst>
+          </a:blip>
+          <a:stretch>
+            <a:fillRect/>
+          </a:stretch>
+        </p:blipFill>
+        <p:spPr>
+          <a:xfrm>
+            <a:off x="2446233" y="19262269"/>
+            <a:ext cx="8027702" cy="4841464"/>
+          </a:xfrm>
+          <a:prstGeom prst="rect">
+            <a:avLst/>
+          </a:prstGeom>
+        </p:spPr>
+      </p:pic>
+      <p:pic>
+        <p:nvPicPr>
+          <p:cNvPr id="3" name="Picture 2"/>
+          <p:cNvPicPr>
+            <a:picLocks noChangeAspect="1"/>
+          </p:cNvPicPr>
+          <p:nvPr/>
+        </p:nvPicPr>
+        <p:blipFill>
+          <a:blip r:embed="rId5">
+            <a:extLst>
+              <a:ext uri="{28A0092B-C50C-407E-A947-70E740481C1C}">
+                <a14:useLocalDpi xmlns:a14="http://schemas.microsoft.com/office/drawing/2010/main" val="0"/>
+              </a:ext>
+            </a:extLst>
+          </a:blip>
+          <a:stretch>
+            <a:fillRect/>
+          </a:stretch>
+        </p:blipFill>
+        <p:spPr>
+          <a:xfrm>
+            <a:off x="2481656" y="24565555"/>
+            <a:ext cx="8027701" cy="4699539"/>
+          </a:xfrm>
+          <a:prstGeom prst="rect">
+            <a:avLst/>
+          </a:prstGeom>
+        </p:spPr>
+      </p:pic>
+      <p:pic>
+        <p:nvPicPr>
+          <p:cNvPr id="4" name="Picture 3"/>
+          <p:cNvPicPr>
+            <a:picLocks noChangeAspect="1"/>
+          </p:cNvPicPr>
+          <p:nvPr/>
+        </p:nvPicPr>
+        <p:blipFill>
+          <a:blip r:embed="rId6">
+            <a:extLst>
+              <a:ext uri="{28A0092B-C50C-407E-A947-70E740481C1C}">
+                <a14:useLocalDpi xmlns:a14="http://schemas.microsoft.com/office/drawing/2010/main" val="0"/>
+              </a:ext>
+            </a:extLst>
+          </a:blip>
+          <a:stretch>
+            <a:fillRect/>
+          </a:stretch>
+        </p:blipFill>
+        <p:spPr>
+          <a:xfrm>
+            <a:off x="12590985" y="19269028"/>
+            <a:ext cx="7928638" cy="4932990"/>
+          </a:xfrm>
+          <a:prstGeom prst="rect">
+            <a:avLst/>
+          </a:prstGeom>
+        </p:spPr>
+      </p:pic>
+      <p:pic>
+        <p:nvPicPr>
+          <p:cNvPr id="5" name="Picture 4"/>
+          <p:cNvPicPr>
+            <a:picLocks noChangeAspect="1"/>
+          </p:cNvPicPr>
+          <p:nvPr/>
+        </p:nvPicPr>
+        <p:blipFill>
+          <a:blip r:embed="rId7">
+            <a:extLst>
+              <a:ext uri="{28A0092B-C50C-407E-A947-70E740481C1C}">
+                <a14:useLocalDpi xmlns:a14="http://schemas.microsoft.com/office/drawing/2010/main" val="0"/>
+              </a:ext>
+            </a:extLst>
+          </a:blip>
+          <a:stretch>
+            <a:fillRect/>
+          </a:stretch>
+        </p:blipFill>
+        <p:spPr>
+          <a:xfrm>
+            <a:off x="12621467" y="24596034"/>
+            <a:ext cx="7928638" cy="4699539"/>
+          </a:xfrm>
+          <a:prstGeom prst="rect">
+            <a:avLst/>
+          </a:prstGeom>
+        </p:spPr>
+      </p:pic>
+      <p:pic>
+        <p:nvPicPr>
+          <p:cNvPr id="6" name="Picture 5"/>
+          <p:cNvPicPr>
+            <a:picLocks noChangeAspect="1"/>
+          </p:cNvPicPr>
+          <p:nvPr/>
+        </p:nvPicPr>
+        <p:blipFill>
+          <a:blip r:embed="rId8">
+            <a:extLst>
+              <a:ext uri="{28A0092B-C50C-407E-A947-70E740481C1C}">
+                <a14:useLocalDpi xmlns:a14="http://schemas.microsoft.com/office/drawing/2010/main" val="0"/>
+              </a:ext>
+            </a:extLst>
+          </a:blip>
+          <a:stretch>
+            <a:fillRect/>
+          </a:stretch>
+        </p:blipFill>
+        <p:spPr>
+          <a:xfrm>
+            <a:off x="22755393" y="19242085"/>
+            <a:ext cx="8392598" cy="4986877"/>
+          </a:xfrm>
+          <a:prstGeom prst="rect">
+            <a:avLst/>
+          </a:prstGeom>
+        </p:spPr>
+      </p:pic>
+      <p:pic>
+        <p:nvPicPr>
+          <p:cNvPr id="7" name="Picture 6"/>
+          <p:cNvPicPr>
+            <a:picLocks noChangeAspect="1"/>
+          </p:cNvPicPr>
+          <p:nvPr/>
+        </p:nvPicPr>
+        <p:blipFill>
+          <a:blip r:embed="rId9">
+            <a:extLst>
+              <a:ext uri="{28A0092B-C50C-407E-A947-70E740481C1C}">
+                <a14:useLocalDpi xmlns:a14="http://schemas.microsoft.com/office/drawing/2010/main" val="0"/>
+              </a:ext>
+            </a:extLst>
+          </a:blip>
+          <a:stretch>
+            <a:fillRect/>
+          </a:stretch>
+        </p:blipFill>
+        <p:spPr>
+          <a:xfrm>
+            <a:off x="22755394" y="24567732"/>
+            <a:ext cx="8392598" cy="4727841"/>
+          </a:xfrm>
+          <a:prstGeom prst="rect">
+            <a:avLst/>
+          </a:prstGeom>
+        </p:spPr>
+      </p:pic>
+      <p:cxnSp>
+        <p:nvCxnSpPr>
+          <p:cNvPr id="20" name="Straight Connector 19"/>
+          <p:cNvCxnSpPr/>
+          <p:nvPr/>
+        </p:nvCxnSpPr>
+        <p:spPr>
+          <a:xfrm>
+            <a:off x="11036198" y="18188940"/>
+            <a:ext cx="0" cy="11892280"/>
+          </a:xfrm>
+          <a:prstGeom prst="line">
+            <a:avLst/>
+          </a:prstGeom>
+        </p:spPr>
+        <p:style>
+          <a:lnRef idx="1">
+            <a:schemeClr val="dk1"/>
+          </a:lnRef>
+          <a:fillRef idx="0">
+            <a:schemeClr val="dk1"/>
+          </a:fillRef>
+          <a:effectRef idx="0">
+            <a:schemeClr val="dk1"/>
+          </a:effectRef>
+          <a:fontRef idx="minor">
+            <a:schemeClr val="tx1"/>
+          </a:fontRef>
+        </p:style>
+      </p:cxnSp>
+      <p:cxnSp>
+        <p:nvCxnSpPr>
+          <p:cNvPr id="46" name="Straight Connector 45"/>
+          <p:cNvCxnSpPr/>
+          <p:nvPr/>
+        </p:nvCxnSpPr>
+        <p:spPr>
+          <a:xfrm>
+            <a:off x="11404708" y="18188940"/>
+            <a:ext cx="0" cy="11892280"/>
+          </a:xfrm>
+          <a:prstGeom prst="line">
+            <a:avLst/>
+          </a:prstGeom>
+        </p:spPr>
+        <p:style>
+          <a:lnRef idx="1">
+            <a:schemeClr val="dk1"/>
+          </a:lnRef>
+          <a:fillRef idx="0">
+            <a:schemeClr val="dk1"/>
+          </a:fillRef>
+          <a:effectRef idx="0">
+            <a:schemeClr val="dk1"/>
+          </a:effectRef>
+          <a:fontRef idx="minor">
+            <a:schemeClr val="tx1"/>
+          </a:fontRef>
+        </p:style>
+      </p:cxnSp>
+      <p:cxnSp>
+        <p:nvCxnSpPr>
+          <p:cNvPr id="47" name="Straight Connector 46"/>
+          <p:cNvCxnSpPr/>
+          <p:nvPr/>
+        </p:nvCxnSpPr>
+        <p:spPr>
+          <a:xfrm>
+            <a:off x="21482688" y="18177357"/>
+            <a:ext cx="0" cy="11892280"/>
+          </a:xfrm>
+          <a:prstGeom prst="line">
+            <a:avLst/>
+          </a:prstGeom>
+        </p:spPr>
+        <p:style>
+          <a:lnRef idx="1">
+            <a:schemeClr val="dk1"/>
+          </a:lnRef>
+          <a:fillRef idx="0">
+            <a:schemeClr val="dk1"/>
+          </a:fillRef>
+          <a:effectRef idx="0">
+            <a:schemeClr val="dk1"/>
+          </a:effectRef>
+          <a:fontRef idx="minor">
+            <a:schemeClr val="tx1"/>
+          </a:fontRef>
+        </p:style>
+      </p:cxnSp>
+      <p:cxnSp>
+        <p:nvCxnSpPr>
+          <p:cNvPr id="48" name="Straight Connector 47"/>
+          <p:cNvCxnSpPr/>
+          <p:nvPr/>
+        </p:nvCxnSpPr>
+        <p:spPr>
+          <a:xfrm>
+            <a:off x="21851198" y="18177357"/>
+            <a:ext cx="0" cy="11892280"/>
+          </a:xfrm>
+          <a:prstGeom prst="line">
+            <a:avLst/>
+          </a:prstGeom>
+        </p:spPr>
+        <p:style>
+          <a:lnRef idx="1">
+            <a:schemeClr val="dk1"/>
+          </a:lnRef>
+          <a:fillRef idx="0">
+            <a:schemeClr val="dk1"/>
+          </a:fillRef>
+          <a:effectRef idx="0">
+            <a:schemeClr val="dk1"/>
+          </a:effectRef>
+          <a:fontRef idx="minor">
+            <a:schemeClr val="tx1"/>
+          </a:fontRef>
+        </p:style>
+      </p:cxnSp>
+      <p:sp>
+        <p:nvSpPr>
+          <p:cNvPr id="44" name="Rectangle 43"/>
+          <p:cNvSpPr/>
+          <p:nvPr/>
+        </p:nvSpPr>
+        <p:spPr>
+          <a:xfrm>
+            <a:off x="5650889" y="18554383"/>
+            <a:ext cx="1757982" cy="707886"/>
+          </a:xfrm>
+          <a:prstGeom prst="rect">
+            <a:avLst/>
+          </a:prstGeom>
+        </p:spPr>
+        <p:txBody>
+          <a:bodyPr wrap="none">
+            <a:spAutoFit/>
+          </a:bodyPr>
+          <a:lstStyle/>
+          <a:p>
+            <a:r>
+              <a:rPr lang="en-US" sz="4000" u="sng" dirty="0" smtClean="0"/>
+              <a:t>Related</a:t>
+            </a:r>
+            <a:endParaRPr lang="en-US" sz="4000" u="sng" dirty="0"/>
+          </a:p>
+        </p:txBody>
+      </p:sp>
+      <p:sp>
+        <p:nvSpPr>
+          <p:cNvPr id="51" name="Rectangle 50"/>
+          <p:cNvSpPr/>
+          <p:nvPr/>
+        </p:nvSpPr>
+        <p:spPr>
+          <a:xfrm>
+            <a:off x="15491552" y="18584297"/>
+            <a:ext cx="2127505" cy="707886"/>
+          </a:xfrm>
+          <a:prstGeom prst="rect">
+            <a:avLst/>
+          </a:prstGeom>
+        </p:spPr>
+        <p:txBody>
+          <a:bodyPr wrap="none">
+            <a:spAutoFit/>
+          </a:bodyPr>
+          <a:lstStyle/>
+          <a:p>
+            <a:r>
+              <a:rPr lang="en-US" sz="4000" u="sng" dirty="0" smtClean="0"/>
+              <a:t>Fifty Fifty</a:t>
+            </a:r>
+            <a:endParaRPr lang="en-US" sz="4000" u="sng" dirty="0"/>
+          </a:p>
+        </p:txBody>
+      </p:sp>
+      <p:sp>
+        <p:nvSpPr>
+          <p:cNvPr id="52" name="Rectangle 51"/>
+          <p:cNvSpPr/>
+          <p:nvPr/>
+        </p:nvSpPr>
+        <p:spPr>
+          <a:xfrm>
+            <a:off x="26061118" y="18554383"/>
+            <a:ext cx="1928733" cy="707886"/>
+          </a:xfrm>
+          <a:prstGeom prst="rect">
+            <a:avLst/>
+          </a:prstGeom>
+        </p:spPr>
+        <p:txBody>
+          <a:bodyPr wrap="none">
+            <a:spAutoFit/>
+          </a:bodyPr>
+          <a:lstStyle/>
+          <a:p>
+            <a:r>
+              <a:rPr lang="en-US" sz="4000" u="sng" dirty="0" smtClean="0"/>
+              <a:t>Random</a:t>
+            </a:r>
+            <a:endParaRPr lang="en-US" sz="4800" u="sng" dirty="0"/>
+          </a:p>
+        </p:txBody>
+      </p:sp>
+      <p:sp>
+        <p:nvSpPr>
+          <p:cNvPr id="56" name="Rectangle 55"/>
+          <p:cNvSpPr/>
+          <p:nvPr/>
+        </p:nvSpPr>
+        <p:spPr>
+          <a:xfrm>
+            <a:off x="25581303" y="8653454"/>
+            <a:ext cx="5890846" cy="1498600"/>
+          </a:xfrm>
+          <a:prstGeom prst="rect">
+            <a:avLst/>
+          </a:prstGeom>
+          <a:solidFill>
+            <a:srgbClr val="FF0000"/>
+          </a:solidFill>
+        </p:spPr>
+        <p:style>
+          <a:lnRef idx="2">
+            <a:schemeClr val="accent1">
+              <a:shade val="50000"/>
+            </a:schemeClr>
+          </a:lnRef>
+          <a:fillRef idx="1">
+            <a:schemeClr val="accent1"/>
+          </a:fillRef>
+          <a:effectRef idx="0">
+            <a:schemeClr val="accent1"/>
+          </a:effectRef>
+          <a:fontRef idx="minor">
+            <a:schemeClr val="lt1"/>
+          </a:fontRef>
+        </p:style>
+        <p:txBody>
+          <a:bodyPr rtlCol="0" anchor="ctr"/>
+          <a:lstStyle/>
+          <a:p>
+            <a:pPr algn="ctr"/>
+            <a:endParaRPr lang="en-US">
+              <a:ln w="0"/>
+              <a:solidFill>
+                <a:srgbClr val="FF0C00"/>
+              </a:solidFill>
+              <a:effectLst>
+                <a:outerShdw blurRad="38100" dist="25400" dir="5400000" algn="ctr" rotWithShape="0">
+                  <a:srgbClr val="6E747A">
+                    <a:alpha val="43000"/>
+                  </a:srgbClr>
+                </a:outerShdw>
+              </a:effectLst>
+            </a:endParaRPr>
+          </a:p>
+        </p:txBody>
+      </p:sp>
+      <p:sp>
+        <p:nvSpPr>
+          <p:cNvPr id="57" name="TextBox 56"/>
+          <p:cNvSpPr txBox="1"/>
+          <p:nvPr/>
+        </p:nvSpPr>
+        <p:spPr>
+          <a:xfrm>
+            <a:off x="26946378" y="8746617"/>
+            <a:ext cx="3300089" cy="1209242"/>
+          </a:xfrm>
+          <a:prstGeom prst="rect">
+            <a:avLst/>
+          </a:prstGeom>
+          <a:noFill/>
+        </p:spPr>
+        <p:txBody>
+          <a:bodyPr wrap="square" rtlCol="0">
+            <a:spAutoFit/>
+          </a:bodyPr>
+          <a:lstStyle/>
+          <a:p>
+            <a:r>
+              <a:rPr lang="en-US" b="1" smtClean="0"/>
+              <a:t>Corpora</a:t>
+            </a:r>
+            <a:endParaRPr lang="en-US" b="1" dirty="0"/>
+          </a:p>
+        </p:txBody>
+      </p:sp>
+      <p:sp>
+        <p:nvSpPr>
+          <p:cNvPr id="58" name="Frame 57"/>
+          <p:cNvSpPr/>
+          <p:nvPr/>
+        </p:nvSpPr>
+        <p:spPr>
+          <a:xfrm>
+            <a:off x="25566766" y="10119360"/>
+            <a:ext cx="5905383" cy="5882640"/>
+          </a:xfrm>
+          <a:prstGeom prst="frame">
+            <a:avLst>
+              <a:gd name="adj1" fmla="val 548"/>
+            </a:avLst>
+          </a:prstGeom>
+          <a:solidFill>
+            <a:schemeClr val="bg2">
+              <a:lumMod val="50000"/>
+            </a:schemeClr>
+          </a:solidFill>
+        </p:spPr>
+        <p:style>
+          <a:lnRef idx="2">
+            <a:schemeClr val="accent1">
+              <a:shade val="50000"/>
+            </a:schemeClr>
+          </a:lnRef>
+          <a:fillRef idx="1">
+            <a:schemeClr val="accent1"/>
+          </a:fillRef>
+          <a:effectRef idx="0">
+            <a:schemeClr val="accent1"/>
+          </a:effectRef>
+          <a:fontRef idx="minor">
+            <a:schemeClr val="lt1"/>
+          </a:fontRef>
+        </p:style>
+        <p:txBody>
+          <a:bodyPr rtlCol="0" anchor="ctr"/>
+          <a:lstStyle/>
+          <a:p>
+            <a:pPr algn="ctr"/>
+            <a:endParaRPr lang="en-US">
+              <a:solidFill>
+                <a:schemeClr val="tx1">
+                  <a:lumMod val="75000"/>
+                  <a:lumOff val="25000"/>
+                </a:schemeClr>
+              </a:solidFill>
+            </a:endParaRPr>
+          </a:p>
+        </p:txBody>
+      </p:sp>
+      <p:sp>
+        <p:nvSpPr>
+          <p:cNvPr id="59" name="TextBox 58"/>
+          <p:cNvSpPr txBox="1"/>
+          <p:nvPr/>
+        </p:nvSpPr>
+        <p:spPr>
+          <a:xfrm>
+            <a:off x="25865438" y="10084125"/>
+            <a:ext cx="2450479" cy="920252"/>
           </a:xfrm>
           <a:prstGeom prst="rect">
             <a:avLst/>
@@ -3959,411 +5321,23 @@
               <a:buChar char="•"/>
             </a:pPr>
             <a:r>
-              <a:rPr lang="en-US" sz="4800" dirty="0" smtClean="0"/>
-              <a:t>Patent Enforcement</a:t>
-            </a:r>
-          </a:p>
-        </p:txBody>
-      </p:sp>
-      <p:sp>
-        <p:nvSpPr>
-          <p:cNvPr id="35" name="TextBox 34"/>
+              <a:rPr lang="en-US" sz="4000" dirty="0" smtClean="0"/>
+              <a:t>Related</a:t>
+            </a:r>
+            <a:endParaRPr lang="en-US" sz="4800" dirty="0"/>
+          </a:p>
+        </p:txBody>
+      </p:sp>
+      <p:sp>
+        <p:nvSpPr>
+          <p:cNvPr id="60" name="TextBox 59"/>
           <p:cNvSpPr txBox="1"/>
           <p:nvPr/>
         </p:nvSpPr>
         <p:spPr>
           <a:xfrm>
-            <a:off x="32634120" y="13792062"/>
-            <a:ext cx="9642910" cy="1569660"/>
-          </a:xfrm>
-          <a:prstGeom prst="rect">
-            <a:avLst/>
-          </a:prstGeom>
-          <a:noFill/>
-        </p:spPr>
-        <p:txBody>
-          <a:bodyPr wrap="square" rtlCol="0">
-            <a:spAutoFit/>
-          </a:bodyPr>
-          <a:lstStyle/>
-          <a:p>
-            <a:pPr marL="457200" indent="-457200">
-              <a:buFont typeface="Courier New" charset="0"/>
-              <a:buChar char="o"/>
-            </a:pPr>
-            <a:r>
-              <a:rPr lang="en-US" sz="3200" dirty="0" smtClean="0"/>
-              <a:t>Enable universities </a:t>
-            </a:r>
-            <a:r>
-              <a:rPr lang="en-US" sz="3200" dirty="0"/>
-              <a:t>to efficiently compare the </a:t>
-            </a:r>
-            <a:r>
-              <a:rPr lang="en-US" sz="3200" dirty="0" smtClean="0"/>
-              <a:t>course                                              descriptions </a:t>
-            </a:r>
-            <a:r>
-              <a:rPr lang="en-US" sz="3200" dirty="0"/>
-              <a:t>and make a guided decision as to whether or not the credits should transfer. </a:t>
-            </a:r>
-          </a:p>
-        </p:txBody>
-      </p:sp>
-      <p:sp>
-        <p:nvSpPr>
-          <p:cNvPr id="36" name="TextBox 35"/>
-          <p:cNvSpPr txBox="1"/>
-          <p:nvPr/>
-        </p:nvSpPr>
-        <p:spPr>
-          <a:xfrm>
-            <a:off x="32634120" y="11245333"/>
-            <a:ext cx="9275879" cy="1569660"/>
-          </a:xfrm>
-          <a:prstGeom prst="rect">
-            <a:avLst/>
-          </a:prstGeom>
-          <a:noFill/>
-        </p:spPr>
-        <p:txBody>
-          <a:bodyPr wrap="square" rtlCol="0">
-            <a:spAutoFit/>
-          </a:bodyPr>
-          <a:lstStyle/>
-          <a:p>
-            <a:pPr marL="457200" indent="-457200">
-              <a:buFont typeface="Courier New" charset="0"/>
-              <a:buChar char="o"/>
-            </a:pPr>
-            <a:r>
-              <a:rPr lang="en-US" sz="3200" dirty="0"/>
-              <a:t>P</a:t>
-            </a:r>
-            <a:r>
-              <a:rPr lang="en-US" sz="3200" dirty="0" smtClean="0"/>
-              <a:t>atents </a:t>
-            </a:r>
-            <a:r>
-              <a:rPr lang="en-US" sz="3200" dirty="0"/>
-              <a:t>can be compared </a:t>
-            </a:r>
-            <a:r>
-              <a:rPr lang="en-US" sz="3200" dirty="0" smtClean="0"/>
-              <a:t>to </a:t>
-            </a:r>
-            <a:r>
-              <a:rPr lang="en-US" sz="3200" dirty="0"/>
-              <a:t>product descriptions </a:t>
-            </a:r>
-            <a:r>
-              <a:rPr lang="en-US" sz="3200" dirty="0" smtClean="0"/>
-              <a:t>quickly and efficiently </a:t>
-            </a:r>
-            <a:r>
-              <a:rPr lang="en-US" sz="3200" dirty="0" smtClean="0"/>
-              <a:t>allowing </a:t>
-            </a:r>
-            <a:r>
-              <a:rPr lang="en-US" sz="3200" dirty="0"/>
-              <a:t>companies to sift through </a:t>
-            </a:r>
-            <a:r>
-              <a:rPr lang="en-US" sz="3200" dirty="0" smtClean="0"/>
-              <a:t>large volumes </a:t>
-            </a:r>
-            <a:r>
-              <a:rPr lang="en-US" sz="3200" dirty="0"/>
-              <a:t>of </a:t>
-            </a:r>
-            <a:r>
-              <a:rPr lang="en-US" sz="3200" dirty="0" smtClean="0"/>
-              <a:t>potential infringements. </a:t>
-            </a:r>
-            <a:endParaRPr lang="en-US" sz="3200" dirty="0"/>
-          </a:p>
-        </p:txBody>
-      </p:sp>
-      <p:pic>
-        <p:nvPicPr>
-          <p:cNvPr id="37" name="Picture 36" descr="plots/Regular_analysis_related_corpus.png"/>
-          <p:cNvPicPr/>
-          <p:nvPr/>
-        </p:nvPicPr>
-        <p:blipFill rotWithShape="1">
-          <a:blip r:embed="rId3">
-            <a:extLst>
-              <a:ext uri="{28A0092B-C50C-407E-A947-70E740481C1C}">
-                <a14:useLocalDpi xmlns:a14="http://schemas.microsoft.com/office/drawing/2010/main" val="0"/>
-              </a:ext>
-            </a:extLst>
-          </a:blip>
-          <a:srcRect l="-9" r="-9"/>
-          <a:stretch/>
-        </p:blipFill>
-        <p:spPr bwMode="auto">
-          <a:xfrm>
-            <a:off x="2729950" y="18742977"/>
-            <a:ext cx="8044070" cy="4955223"/>
-          </a:xfrm>
-          <a:prstGeom prst="rect">
-            <a:avLst/>
-          </a:prstGeom>
-          <a:noFill/>
-          <a:ln>
-            <a:noFill/>
-          </a:ln>
-        </p:spPr>
-      </p:pic>
-      <p:pic>
-        <p:nvPicPr>
-          <p:cNvPr id="38" name="Picture 37" descr="plots/Multi-tiered_analysis_related_corpus.png"/>
-          <p:cNvPicPr/>
-          <p:nvPr/>
-        </p:nvPicPr>
-        <p:blipFill rotWithShape="1">
-          <a:blip r:embed="rId4">
-            <a:extLst>
-              <a:ext uri="{28A0092B-C50C-407E-A947-70E740481C1C}">
-                <a14:useLocalDpi xmlns:a14="http://schemas.microsoft.com/office/drawing/2010/main" val="0"/>
-              </a:ext>
-            </a:extLst>
-          </a:blip>
-          <a:srcRect l="-1224" t="-1295" r="-1224" b="-1295"/>
-          <a:stretch/>
-        </p:blipFill>
-        <p:spPr bwMode="auto">
-          <a:xfrm>
-            <a:off x="2611510" y="23698200"/>
-            <a:ext cx="8280950" cy="4759960"/>
-          </a:xfrm>
-          <a:prstGeom prst="rect">
-            <a:avLst/>
-          </a:prstGeom>
-          <a:noFill/>
-          <a:ln>
-            <a:noFill/>
-          </a:ln>
-        </p:spPr>
-      </p:pic>
-      <p:pic>
-        <p:nvPicPr>
-          <p:cNvPr id="39" name="Picture 38" descr="plots/Regular_analysis_fifty_fifty_corpus.png"/>
-          <p:cNvPicPr/>
-          <p:nvPr/>
-        </p:nvPicPr>
-        <p:blipFill rotWithShape="1">
-          <a:blip r:embed="rId5">
-            <a:extLst>
-              <a:ext uri="{28A0092B-C50C-407E-A947-70E740481C1C}">
-                <a14:useLocalDpi xmlns:a14="http://schemas.microsoft.com/office/drawing/2010/main" val="0"/>
-              </a:ext>
-            </a:extLst>
-          </a:blip>
-          <a:srcRect l="3475" t="3454" r="3421" b="-6411"/>
-          <a:stretch/>
-        </p:blipFill>
-        <p:spPr bwMode="auto">
-          <a:xfrm>
-            <a:off x="11493560" y="18938240"/>
-            <a:ext cx="7478485" cy="5081089"/>
-          </a:xfrm>
-          <a:prstGeom prst="rect">
-            <a:avLst/>
-          </a:prstGeom>
-          <a:noFill/>
-          <a:ln>
-            <a:noFill/>
-          </a:ln>
-          <a:extLst>
-            <a:ext uri="{53640926-AAD7-44D8-BBD7-CCE9431645EC}">
-              <a14:shadowObscured xmlns:a14="http://schemas.microsoft.com/office/drawing/2010/main"/>
-            </a:ext>
-          </a:extLst>
-        </p:spPr>
-      </p:pic>
-      <p:pic>
-        <p:nvPicPr>
-          <p:cNvPr id="40" name="Picture 39" descr="plots/Multi-tiered_analysis_fifty_fifty_corpus.png"/>
-          <p:cNvPicPr/>
-          <p:nvPr/>
-        </p:nvPicPr>
-        <p:blipFill rotWithShape="1">
-          <a:blip r:embed="rId6">
-            <a:extLst>
-              <a:ext uri="{28A0092B-C50C-407E-A947-70E740481C1C}">
-                <a14:useLocalDpi xmlns:a14="http://schemas.microsoft.com/office/drawing/2010/main" val="0"/>
-              </a:ext>
-            </a:extLst>
-          </a:blip>
-          <a:srcRect l="3398" t="3383" r="3398" b="-6386"/>
-          <a:stretch/>
-        </p:blipFill>
-        <p:spPr bwMode="auto">
-          <a:xfrm>
-            <a:off x="11493561" y="23959696"/>
-            <a:ext cx="7468872" cy="4835070"/>
-          </a:xfrm>
-          <a:prstGeom prst="rect">
-            <a:avLst/>
-          </a:prstGeom>
-          <a:noFill/>
-          <a:ln>
-            <a:noFill/>
-          </a:ln>
-          <a:extLst>
-            <a:ext uri="{53640926-AAD7-44D8-BBD7-CCE9431645EC}">
-              <a14:shadowObscured xmlns:a14="http://schemas.microsoft.com/office/drawing/2010/main"/>
-            </a:ext>
-          </a:extLst>
-        </p:spPr>
-      </p:pic>
-      <p:pic>
-        <p:nvPicPr>
-          <p:cNvPr id="41" name="Picture 40" descr="plots/Regular_analysis_random_corpus.png"/>
-          <p:cNvPicPr/>
-          <p:nvPr/>
-        </p:nvPicPr>
-        <p:blipFill rotWithShape="1">
-          <a:blip r:embed="rId7">
-            <a:extLst>
-              <a:ext uri="{28A0092B-C50C-407E-A947-70E740481C1C}">
-                <a14:useLocalDpi xmlns:a14="http://schemas.microsoft.com/office/drawing/2010/main" val="0"/>
-              </a:ext>
-            </a:extLst>
-          </a:blip>
-          <a:srcRect l="3403" t="-1496" r="3376" b="-1496"/>
-          <a:stretch/>
-        </p:blipFill>
-        <p:spPr bwMode="auto">
-          <a:xfrm>
-            <a:off x="19573144" y="18742976"/>
-            <a:ext cx="7946577" cy="4955223"/>
-          </a:xfrm>
-          <a:prstGeom prst="rect">
-            <a:avLst/>
-          </a:prstGeom>
-          <a:noFill/>
-          <a:ln>
-            <a:noFill/>
-          </a:ln>
-          <a:extLst>
-            <a:ext uri="{53640926-AAD7-44D8-BBD7-CCE9431645EC}">
-              <a14:shadowObscured xmlns:a14="http://schemas.microsoft.com/office/drawing/2010/main"/>
-            </a:ext>
-          </a:extLst>
-        </p:spPr>
-      </p:pic>
-      <p:pic>
-        <p:nvPicPr>
-          <p:cNvPr id="42" name="Picture 41" descr="plots/Multi-tiered_analysis_random_corpus.png"/>
-          <p:cNvPicPr/>
-          <p:nvPr/>
-        </p:nvPicPr>
-        <p:blipFill rotWithShape="1">
-          <a:blip r:embed="rId8">
-            <a:extLst>
-              <a:ext uri="{28A0092B-C50C-407E-A947-70E740481C1C}">
-                <a14:useLocalDpi xmlns:a14="http://schemas.microsoft.com/office/drawing/2010/main" val="0"/>
-              </a:ext>
-            </a:extLst>
-          </a:blip>
-          <a:srcRect l="2868" t="-1457" r="2868" b="-1457"/>
-          <a:stretch/>
-        </p:blipFill>
-        <p:spPr bwMode="auto">
-          <a:xfrm>
-            <a:off x="19573144" y="23698199"/>
-            <a:ext cx="7946577" cy="5096567"/>
-          </a:xfrm>
-          <a:prstGeom prst="rect">
-            <a:avLst/>
-          </a:prstGeom>
-          <a:noFill/>
-          <a:ln>
-            <a:noFill/>
-          </a:ln>
-          <a:extLst>
-            <a:ext uri="{53640926-AAD7-44D8-BBD7-CCE9431645EC}">
-              <a14:shadowObscured xmlns:a14="http://schemas.microsoft.com/office/drawing/2010/main"/>
-            </a:ext>
-          </a:extLst>
-        </p:spPr>
-      </p:pic>
-      <p:sp>
-        <p:nvSpPr>
-          <p:cNvPr id="43" name="TextBox 42"/>
-          <p:cNvSpPr txBox="1"/>
-          <p:nvPr/>
-        </p:nvSpPr>
-        <p:spPr>
-          <a:xfrm>
-            <a:off x="31665375" y="18413211"/>
-            <a:ext cx="10611655" cy="12289198"/>
-          </a:xfrm>
-          <a:prstGeom prst="rect">
-            <a:avLst/>
-          </a:prstGeom>
-          <a:noFill/>
-        </p:spPr>
-        <p:txBody>
-          <a:bodyPr wrap="square" rtlCol="0">
-            <a:spAutoFit/>
-          </a:bodyPr>
-          <a:lstStyle/>
-          <a:p>
-            <a:r>
-              <a:rPr lang="en-US" sz="4800" dirty="0"/>
-              <a:t>This data shows that it is possible to boost efficiency in natural language processing applications using a multi-tiered approach. It also shows that this approach works best on broad sets of documents that span multiple different topics. However, it still proves to be effective for boosting efficiency on more focused data sets. This means that the approach has a wide range of potential applications in the Data Science Industry. Considerations should be made to implement a similar system in any application involved in natural language processing and text similarity analysis. </a:t>
-            </a:r>
-          </a:p>
-          <a:p>
-            <a:endParaRPr lang="en-US" dirty="0"/>
-          </a:p>
-        </p:txBody>
-      </p:sp>
-      <p:sp>
-        <p:nvSpPr>
-          <p:cNvPr id="53" name="TextBox 52"/>
-          <p:cNvSpPr txBox="1"/>
-          <p:nvPr/>
-        </p:nvSpPr>
-        <p:spPr>
-          <a:xfrm>
-            <a:off x="1913922" y="10464142"/>
-            <a:ext cx="12231846" cy="6195222"/>
-          </a:xfrm>
-          <a:prstGeom prst="rect">
-            <a:avLst/>
-          </a:prstGeom>
-          <a:noFill/>
-        </p:spPr>
-        <p:txBody>
-          <a:bodyPr wrap="square" rtlCol="0">
-            <a:spAutoFit/>
-          </a:bodyPr>
-          <a:lstStyle/>
-          <a:p>
-            <a:r>
-              <a:rPr lang="en-US" sz="3600" dirty="0"/>
-              <a:t>Natural Language Processing is an increasingly researched field that has a few major barricades holding back its progress. One of these barricades is the intensive computational costs used by its processes. The goal for this project is to explore potential efficiencies that can be gained by implementing a multi-tiered filter based analysis system. A text-analysis script was written and designed in order to prove this hypothesis. The resulting data indicates that a multi-tier approach can be successfully implemented for an increase in efficiency. </a:t>
-            </a:r>
-          </a:p>
-          <a:p>
-            <a:endParaRPr lang="en-US" dirty="0"/>
-          </a:p>
-        </p:txBody>
-      </p:sp>
-      <p:sp>
-        <p:nvSpPr>
-          <p:cNvPr id="54" name="TextBox 53"/>
-          <p:cNvSpPr txBox="1"/>
-          <p:nvPr/>
-        </p:nvSpPr>
-        <p:spPr>
-          <a:xfrm>
-            <a:off x="32065595" y="12692960"/>
-            <a:ext cx="4771434" cy="1085810"/>
+            <a:off x="25849072" y="11779455"/>
+            <a:ext cx="2820003" cy="920252"/>
           </a:xfrm>
           <a:prstGeom prst="rect">
             <a:avLst/>
@@ -4384,22 +5358,23 @@
               <a:buChar char="•"/>
             </a:pPr>
             <a:r>
-              <a:rPr lang="en-US" sz="4800" dirty="0" smtClean="0"/>
-              <a:t>Credit Transfers</a:t>
-            </a:r>
-          </a:p>
-        </p:txBody>
-      </p:sp>
-      <p:sp>
-        <p:nvSpPr>
-          <p:cNvPr id="55" name="TextBox 54"/>
+              <a:rPr lang="en-US" sz="4000" dirty="0" smtClean="0"/>
+              <a:t>Fifty Fifty</a:t>
+            </a:r>
+            <a:endParaRPr lang="en-US" sz="4000" dirty="0"/>
+          </a:p>
+        </p:txBody>
+      </p:sp>
+      <p:sp>
+        <p:nvSpPr>
+          <p:cNvPr id="61" name="TextBox 60"/>
           <p:cNvSpPr txBox="1"/>
           <p:nvPr/>
         </p:nvSpPr>
         <p:spPr>
           <a:xfrm>
-            <a:off x="16347145" y="6215901"/>
-            <a:ext cx="11117402" cy="923330"/>
+            <a:off x="25908733" y="13708604"/>
+            <a:ext cx="2621230" cy="920252"/>
           </a:xfrm>
           <a:prstGeom prst="rect">
             <a:avLst/>
@@ -4412,19 +5387,116 @@
           </a:bodyPr>
           <a:lstStyle/>
           <a:p>
-            <a:r>
-              <a:rPr lang="en-US" sz="5400" b="1" dirty="0" smtClean="0"/>
-              <a:t>By Daniel O’Brien and Michael </a:t>
-            </a:r>
-            <a:r>
-              <a:rPr lang="en-US" sz="5400" b="1" dirty="0" err="1"/>
-              <a:t>G</a:t>
-            </a:r>
-            <a:r>
-              <a:rPr lang="en-US" sz="5400" b="1" dirty="0" err="1" smtClean="0"/>
-              <a:t>ildein</a:t>
-            </a:r>
-            <a:endParaRPr lang="en-US" sz="7200" b="1" dirty="0"/>
+            <a:pPr marL="685800" indent="-685800">
+              <a:lnSpc>
+                <a:spcPct val="150000"/>
+              </a:lnSpc>
+              <a:buFont typeface="Arial" charset="0"/>
+              <a:buChar char="•"/>
+            </a:pPr>
+            <a:r>
+              <a:rPr lang="en-US" sz="4000" dirty="0" smtClean="0"/>
+              <a:t>Random</a:t>
+            </a:r>
+            <a:endParaRPr lang="en-US" sz="4800" dirty="0"/>
+          </a:p>
+        </p:txBody>
+      </p:sp>
+      <p:sp>
+        <p:nvSpPr>
+          <p:cNvPr id="62" name="TextBox 61"/>
+          <p:cNvSpPr txBox="1"/>
+          <p:nvPr/>
+        </p:nvSpPr>
+        <p:spPr>
+          <a:xfrm>
+            <a:off x="26595479" y="10939515"/>
+            <a:ext cx="4651940" cy="830997"/>
+          </a:xfrm>
+          <a:prstGeom prst="rect">
+            <a:avLst/>
+          </a:prstGeom>
+          <a:noFill/>
+        </p:spPr>
+        <p:txBody>
+          <a:bodyPr wrap="square" rtlCol="0">
+            <a:spAutoFit/>
+          </a:bodyPr>
+          <a:lstStyle/>
+          <a:p>
+            <a:r>
+              <a:rPr lang="en-US" sz="2400" dirty="0" smtClean="0"/>
+              <a:t>Corpus is filled with articles related to given seed. </a:t>
+            </a:r>
+            <a:r>
+              <a:rPr lang="en-US" sz="2400" dirty="0" smtClean="0"/>
+              <a:t>Worst</a:t>
+            </a:r>
+            <a:r>
+              <a:rPr lang="en-US" sz="2400" dirty="0" smtClean="0"/>
+              <a:t> case scenario</a:t>
+            </a:r>
+            <a:endParaRPr lang="en-US" sz="2400" dirty="0"/>
+          </a:p>
+        </p:txBody>
+      </p:sp>
+      <p:sp>
+        <p:nvSpPr>
+          <p:cNvPr id="63" name="TextBox 62"/>
+          <p:cNvSpPr txBox="1"/>
+          <p:nvPr/>
+        </p:nvSpPr>
+        <p:spPr>
+          <a:xfrm>
+            <a:off x="26555052" y="12602989"/>
+            <a:ext cx="4651940" cy="1200329"/>
+          </a:xfrm>
+          <a:prstGeom prst="rect">
+            <a:avLst/>
+          </a:prstGeom>
+          <a:noFill/>
+        </p:spPr>
+        <p:txBody>
+          <a:bodyPr wrap="square" rtlCol="0">
+            <a:spAutoFit/>
+          </a:bodyPr>
+          <a:lstStyle/>
+          <a:p>
+            <a:r>
+              <a:rPr lang="en-US" sz="2400" dirty="0" smtClean="0"/>
+              <a:t>Corpus is half filled with related articles, half filled with random articles. Average case scenario.</a:t>
+            </a:r>
+            <a:endParaRPr lang="en-US" sz="2400" dirty="0"/>
+          </a:p>
+        </p:txBody>
+      </p:sp>
+      <p:sp>
+        <p:nvSpPr>
+          <p:cNvPr id="64" name="TextBox 63"/>
+          <p:cNvSpPr txBox="1"/>
+          <p:nvPr/>
+        </p:nvSpPr>
+        <p:spPr>
+          <a:xfrm>
+            <a:off x="26595479" y="14521996"/>
+            <a:ext cx="4651940" cy="830997"/>
+          </a:xfrm>
+          <a:prstGeom prst="rect">
+            <a:avLst/>
+          </a:prstGeom>
+          <a:noFill/>
+        </p:spPr>
+        <p:txBody>
+          <a:bodyPr wrap="square" rtlCol="0">
+            <a:spAutoFit/>
+          </a:bodyPr>
+          <a:lstStyle/>
+          <a:p>
+            <a:r>
+              <a:rPr lang="en-US" sz="2400" dirty="0" smtClean="0"/>
+              <a:t>Corpus is filled with entirely random articles. Best case scenario.</a:t>
+            </a:r>
+            <a:endParaRPr lang="en-US" sz="2400" dirty="0"/>
           </a:p>
         </p:txBody>
       </p:sp>
@@ -4438,13 +5510,6 @@
   <p:clrMapOvr>
     <a:masterClrMapping/>
   </p:clrMapOvr>
-  <p:timing>
-    <p:tnLst>
-      <p:par>
-        <p:cTn id="1" dur="indefinite" restart="never" nodeType="tmRoot"/>
-      </p:par>
-    </p:tnLst>
-  </p:timing>
 </p:sld>
 </file>
 
@@ -4707,4 +5772,265 @@
     </a:ext>
   </a:extLst>
 </a:theme>
+</file>
+
+<file path=ppt/theme/theme2.xml><?xml version="1.0" encoding="utf-8"?>
+<a:theme xmlns:a="http://schemas.openxmlformats.org/drawingml/2006/main" name="Office Theme">
+  <a:themeElements>
+    <a:clrScheme name="Office">
+      <a:dk1>
+        <a:sysClr val="windowText" lastClr="000000"/>
+      </a:dk1>
+      <a:lt1>
+        <a:sysClr val="window" lastClr="FFFFFF"/>
+      </a:lt1>
+      <a:dk2>
+        <a:srgbClr val="44546A"/>
+      </a:dk2>
+      <a:lt2>
+        <a:srgbClr val="E7E6E6"/>
+      </a:lt2>
+      <a:accent1>
+        <a:srgbClr val="5B9BD5"/>
+      </a:accent1>
+      <a:accent2>
+        <a:srgbClr val="ED7D31"/>
+      </a:accent2>
+      <a:accent3>
+        <a:srgbClr val="A5A5A5"/>
+      </a:accent3>
+      <a:accent4>
+        <a:srgbClr val="FFC000"/>
+      </a:accent4>
+      <a:accent5>
+        <a:srgbClr val="4472C4"/>
+      </a:accent5>
+      <a:accent6>
+        <a:srgbClr val="70AD47"/>
+      </a:accent6>
+      <a:hlink>
+        <a:srgbClr val="0563C1"/>
+      </a:hlink>
+      <a:folHlink>
+        <a:srgbClr val="954F72"/>
+      </a:folHlink>
+    </a:clrScheme>
+    <a:fontScheme name="Office">
+      <a:majorFont>
+        <a:latin typeface="Calibri Light" panose="020F0302020204030204"/>
+        <a:ea typeface=""/>
+        <a:cs typeface=""/>
+        <a:font script="Jpan" typeface="Yu Gothic Light"/>
+        <a:font script="Hang" typeface="맑은 고딕"/>
+        <a:font script="Hans" typeface="DengXian Light"/>
+        <a:font script="Hant" typeface="新細明體"/>
+        <a:font script="Arab" typeface="Times New Roman"/>
+        <a:font script="Hebr" typeface="Times New Roman"/>
+        <a:font script="Thai" typeface="Angsana New"/>
+        <a:font script="Ethi" typeface="Nyala"/>
+        <a:font script="Beng" typeface="Vrinda"/>
+        <a:font script="Gujr" typeface="Shruti"/>
+        <a:font script="Khmr" typeface="MoolBoran"/>
+        <a:font script="Knda" typeface="Tunga"/>
+        <a:font script="Guru" typeface="Raavi"/>
+        <a:font script="Cans" typeface="Euphemia"/>
+        <a:font script="Cher" typeface="Plantagenet Cherokee"/>
+        <a:font script="Yiii" typeface="Microsoft Yi Baiti"/>
+        <a:font script="Tibt" typeface="Microsoft Himalaya"/>
+        <a:font script="Thaa" typeface="MV Boli"/>
+        <a:font script="Deva" typeface="Mangal"/>
+        <a:font script="Telu" typeface="Gautami"/>
+        <a:font script="Taml" typeface="Latha"/>
+        <a:font script="Syrc" typeface="Estrangelo Edessa"/>
+        <a:font script="Orya" typeface="Kalinga"/>
+        <a:font script="Mlym" typeface="Kartika"/>
+        <a:font script="Laoo" typeface="DokChampa"/>
+        <a:font script="Sinh" typeface="Iskoola Pota"/>
+        <a:font script="Mong" typeface="Mongolian Baiti"/>
+        <a:font script="Viet" typeface="Times New Roman"/>
+        <a:font script="Uigh" typeface="Microsoft Uighur"/>
+        <a:font script="Geor" typeface="Sylfaen"/>
+      </a:majorFont>
+      <a:minorFont>
+        <a:latin typeface="Calibri" panose="020F0502020204030204"/>
+        <a:ea typeface=""/>
+        <a:cs typeface=""/>
+        <a:font script="Jpan" typeface="Yu Gothic"/>
+        <a:font script="Hang" typeface="맑은 고딕"/>
+        <a:font script="Hans" typeface="DengXian"/>
+        <a:font script="Hant" typeface="新細明體"/>
+        <a:font script="Arab" typeface="Arial"/>
+        <a:font script="Hebr" typeface="Arial"/>
+        <a:font script="Thai" typeface="Cordia New"/>
+        <a:font script="Ethi" typeface="Nyala"/>
+        <a:font script="Beng" typeface="Vrinda"/>
+        <a:font script="Gujr" typeface="Shruti"/>
+        <a:font script="Khmr" typeface="DaunPenh"/>
+        <a:font script="Knda" typeface="Tunga"/>
+        <a:font script="Guru" typeface="Raavi"/>
+        <a:font script="Cans" typeface="Euphemia"/>
+        <a:font script="Cher" typeface="Plantagenet Cherokee"/>
+        <a:font script="Yiii" typeface="Microsoft Yi Baiti"/>
+        <a:font script="Tibt" typeface="Microsoft Himalaya"/>
+        <a:font script="Thaa" typeface="MV Boli"/>
+        <a:font script="Deva" typeface="Mangal"/>
+        <a:font script="Telu" typeface="Gautami"/>
+        <a:font script="Taml" typeface="Latha"/>
+        <a:font script="Syrc" typeface="Estrangelo Edessa"/>
+        <a:font script="Orya" typeface="Kalinga"/>
+        <a:font script="Mlym" typeface="Kartika"/>
+        <a:font script="Laoo" typeface="DokChampa"/>
+        <a:font script="Sinh" typeface="Iskoola Pota"/>
+        <a:font script="Mong" typeface="Mongolian Baiti"/>
+        <a:font script="Viet" typeface="Arial"/>
+        <a:font script="Uigh" typeface="Microsoft Uighur"/>
+        <a:font script="Geor" typeface="Sylfaen"/>
+      </a:minorFont>
+    </a:fontScheme>
+    <a:fmtScheme name="Office">
+      <a:fillStyleLst>
+        <a:solidFill>
+          <a:schemeClr val="phClr"/>
+        </a:solidFill>
+        <a:gradFill rotWithShape="1">
+          <a:gsLst>
+            <a:gs pos="0">
+              <a:schemeClr val="phClr">
+                <a:lumMod val="110000"/>
+                <a:satMod val="105000"/>
+                <a:tint val="67000"/>
+              </a:schemeClr>
+            </a:gs>
+            <a:gs pos="50000">
+              <a:schemeClr val="phClr">
+                <a:lumMod val="105000"/>
+                <a:satMod val="103000"/>
+                <a:tint val="73000"/>
+              </a:schemeClr>
+            </a:gs>
+            <a:gs pos="100000">
+              <a:schemeClr val="phClr">
+                <a:lumMod val="105000"/>
+                <a:satMod val="109000"/>
+                <a:tint val="81000"/>
+              </a:schemeClr>
+            </a:gs>
+          </a:gsLst>
+          <a:lin ang="5400000" scaled="0"/>
+        </a:gradFill>
+        <a:gradFill rotWithShape="1">
+          <a:gsLst>
+            <a:gs pos="0">
+              <a:schemeClr val="phClr">
+                <a:satMod val="103000"/>
+                <a:lumMod val="102000"/>
+                <a:tint val="94000"/>
+              </a:schemeClr>
+            </a:gs>
+            <a:gs pos="50000">
+              <a:schemeClr val="phClr">
+                <a:satMod val="110000"/>
+                <a:lumMod val="100000"/>
+                <a:shade val="100000"/>
+              </a:schemeClr>
+            </a:gs>
+            <a:gs pos="100000">
+              <a:schemeClr val="phClr">
+                <a:lumMod val="99000"/>
+                <a:satMod val="120000"/>
+                <a:shade val="78000"/>
+              </a:schemeClr>
+            </a:gs>
+          </a:gsLst>
+          <a:lin ang="5400000" scaled="0"/>
+        </a:gradFill>
+      </a:fillStyleLst>
+      <a:lnStyleLst>
+        <a:ln w="6350" cap="flat" cmpd="sng" algn="ctr">
+          <a:solidFill>
+            <a:schemeClr val="phClr"/>
+          </a:solidFill>
+          <a:prstDash val="solid"/>
+          <a:miter lim="800000"/>
+        </a:ln>
+        <a:ln w="12700" cap="flat" cmpd="sng" algn="ctr">
+          <a:solidFill>
+            <a:schemeClr val="phClr"/>
+          </a:solidFill>
+          <a:prstDash val="solid"/>
+          <a:miter lim="800000"/>
+        </a:ln>
+        <a:ln w="19050" cap="flat" cmpd="sng" algn="ctr">
+          <a:solidFill>
+            <a:schemeClr val="phClr"/>
+          </a:solidFill>
+          <a:prstDash val="solid"/>
+          <a:miter lim="800000"/>
+        </a:ln>
+      </a:lnStyleLst>
+      <a:effectStyleLst>
+        <a:effectStyle>
+          <a:effectLst/>
+        </a:effectStyle>
+        <a:effectStyle>
+          <a:effectLst/>
+        </a:effectStyle>
+        <a:effectStyle>
+          <a:effectLst>
+            <a:outerShdw blurRad="57150" dist="19050" dir="5400000" algn="ctr" rotWithShape="0">
+              <a:srgbClr val="000000">
+                <a:alpha val="63000"/>
+              </a:srgbClr>
+            </a:outerShdw>
+          </a:effectLst>
+        </a:effectStyle>
+      </a:effectStyleLst>
+      <a:bgFillStyleLst>
+        <a:solidFill>
+          <a:schemeClr val="phClr"/>
+        </a:solidFill>
+        <a:solidFill>
+          <a:schemeClr val="phClr">
+            <a:tint val="95000"/>
+            <a:satMod val="170000"/>
+          </a:schemeClr>
+        </a:solidFill>
+        <a:gradFill rotWithShape="1">
+          <a:gsLst>
+            <a:gs pos="0">
+              <a:schemeClr val="phClr">
+                <a:tint val="93000"/>
+                <a:satMod val="150000"/>
+                <a:shade val="98000"/>
+                <a:lumMod val="102000"/>
+              </a:schemeClr>
+            </a:gs>
+            <a:gs pos="50000">
+              <a:schemeClr val="phClr">
+                <a:tint val="98000"/>
+                <a:satMod val="130000"/>
+                <a:shade val="90000"/>
+                <a:lumMod val="103000"/>
+              </a:schemeClr>
+            </a:gs>
+            <a:gs pos="100000">
+              <a:schemeClr val="phClr">
+                <a:shade val="63000"/>
+                <a:satMod val="120000"/>
+              </a:schemeClr>
+            </a:gs>
+          </a:gsLst>
+          <a:lin ang="5400000" scaled="0"/>
+        </a:gradFill>
+      </a:bgFillStyleLst>
+    </a:fmtScheme>
+  </a:themeElements>
+  <a:objectDefaults/>
+  <a:extraClrSchemeLst/>
+  <a:extLst>
+    <a:ext uri="{05A4C25C-085E-4340-85A3-A5531E510DB2}">
+      <thm15:themeFamily xmlns:thm15="http://schemas.microsoft.com/office/thememl/2012/main" name="Office Theme" id="{62F939B6-93AF-4DB8-9C6B-D6C7DFDC589F}" vid="{4A3C46E8-61CC-4603-A589-7422A47A8E4A}"/>
+    </a:ext>
+  </a:extLst>
+</a:theme>
 </file>
</xml_diff>